<commit_message>
PPT on project1 for DIABETES DISEASE PREDICTION
</commit_message>
<xml_diff>
--- a/Data Analytics Associate final project -DIABETES DISEASE PREDICTION.pptx
+++ b/Data Analytics Associate final project -DIABETES DISEASE PREDICTION.pptx
@@ -13,17 +13,19 @@
     <p:sldId id="263" r:id="rId7"/>
     <p:sldId id="261" r:id="rId8"/>
     <p:sldId id="262" r:id="rId9"/>
-    <p:sldId id="264" r:id="rId10"/>
-    <p:sldId id="265" r:id="rId11"/>
-    <p:sldId id="270" r:id="rId12"/>
-    <p:sldId id="266" r:id="rId13"/>
-    <p:sldId id="273" r:id="rId14"/>
-    <p:sldId id="274" r:id="rId15"/>
-    <p:sldId id="271" r:id="rId16"/>
-    <p:sldId id="272" r:id="rId17"/>
-    <p:sldId id="267" r:id="rId18"/>
-    <p:sldId id="269" r:id="rId19"/>
-    <p:sldId id="268" r:id="rId20"/>
+    <p:sldId id="275" r:id="rId10"/>
+    <p:sldId id="264" r:id="rId11"/>
+    <p:sldId id="265" r:id="rId12"/>
+    <p:sldId id="270" r:id="rId13"/>
+    <p:sldId id="266" r:id="rId14"/>
+    <p:sldId id="276" r:id="rId15"/>
+    <p:sldId id="273" r:id="rId16"/>
+    <p:sldId id="274" r:id="rId17"/>
+    <p:sldId id="271" r:id="rId18"/>
+    <p:sldId id="272" r:id="rId19"/>
+    <p:sldId id="267" r:id="rId20"/>
+    <p:sldId id="269" r:id="rId21"/>
+    <p:sldId id="268" r:id="rId22"/>
   </p:sldIdLst>
   <p:sldSz cx="12192000" cy="6858000"/>
   <p:notesSz cx="6858000" cy="9144000"/>
@@ -122,13 +124,18 @@
       </a:defRPr>
     </a:lvl9pPr>
   </p:defaultTextStyle>
+  <p:extLst>
+    <p:ext uri="{EFAFB233-063F-42B5-8137-9DF3F51BA10A}">
+      <p15:sldGuideLst xmlns:p15="http://schemas.microsoft.com/office/powerpoint/2012/main"/>
+    </p:ext>
+  </p:extLst>
 </p:presentation>
 </file>
 
 <file path=ppt/revisionInfo.xml><?xml version="1.0" encoding="utf-8"?>
 <p1510:revInfo xmlns:a="http://schemas.openxmlformats.org/drawingml/2006/main" xmlns:r="http://schemas.openxmlformats.org/officeDocument/2006/relationships" xmlns:p1510="http://schemas.microsoft.com/office/powerpoint/2015/10/main">
   <p1510:revLst>
-    <p1510:client id="{D533F85C-5BFA-4094-9BEF-19199FDCB1F0}" v="9" dt="2022-08-19T10:48:20.224"/>
+    <p1510:client id="{D533F85C-5BFA-4094-9BEF-19199FDCB1F0}" v="17" dt="2022-08-20T11:42:58.793"/>
   </p1510:revLst>
 </p1510:revInfo>
 </file>
@@ -138,26 +145,181 @@
   <pc:docChgLst>
     <pc:chgData name="pavan kumar" userId="f288574e5ad30b2c" providerId="LiveId" clId="{D533F85C-5BFA-4094-9BEF-19199FDCB1F0}"/>
     <pc:docChg chg="custSel addSld modSld">
-      <pc:chgData name="pavan kumar" userId="f288574e5ad30b2c" providerId="LiveId" clId="{D533F85C-5BFA-4094-9BEF-19199FDCB1F0}" dt="2022-08-19T11:00:21.340" v="247" actId="27636"/>
+      <pc:chgData name="pavan kumar" userId="f288574e5ad30b2c" providerId="LiveId" clId="{D533F85C-5BFA-4094-9BEF-19199FDCB1F0}" dt="2022-08-20T11:44:40.804" v="1163" actId="115"/>
       <pc:docMkLst>
         <pc:docMk/>
       </pc:docMkLst>
-      <pc:sldChg chg="addSp modSp mod">
-        <pc:chgData name="pavan kumar" userId="f288574e5ad30b2c" providerId="LiveId" clId="{D533F85C-5BFA-4094-9BEF-19199FDCB1F0}" dt="2022-08-19T09:30:23.830" v="15" actId="14100"/>
+      <pc:sldChg chg="addSp modSp mod setBg">
+        <pc:chgData name="pavan kumar" userId="f288574e5ad30b2c" providerId="LiveId" clId="{D533F85C-5BFA-4094-9BEF-19199FDCB1F0}" dt="2022-08-20T11:42:58.793" v="1160"/>
+        <pc:sldMkLst>
+          <pc:docMk/>
+          <pc:sldMk cId="3556427862" sldId="256"/>
+        </pc:sldMkLst>
+        <pc:spChg chg="mod">
+          <ac:chgData name="pavan kumar" userId="f288574e5ad30b2c" providerId="LiveId" clId="{D533F85C-5BFA-4094-9BEF-19199FDCB1F0}" dt="2022-08-20T11:41:48.148" v="1158" actId="20577"/>
+          <ac:spMkLst>
+            <pc:docMk/>
+            <pc:sldMk cId="3556427862" sldId="256"/>
+            <ac:spMk id="2" creationId="{F8632305-5451-E80B-7282-D386DB11C886}"/>
+          </ac:spMkLst>
+        </pc:spChg>
+        <pc:spChg chg="mod">
+          <ac:chgData name="pavan kumar" userId="f288574e5ad30b2c" providerId="LiveId" clId="{D533F85C-5BFA-4094-9BEF-19199FDCB1F0}" dt="2022-08-20T11:41:13.841" v="1152" actId="14861"/>
+          <ac:spMkLst>
+            <pc:docMk/>
+            <pc:sldMk cId="3556427862" sldId="256"/>
+            <ac:spMk id="3" creationId="{ECE8C002-A0CD-0D50-C6C9-3458ABEB175E}"/>
+          </ac:spMkLst>
+        </pc:spChg>
+        <pc:picChg chg="add mod modCrop">
+          <ac:chgData name="pavan kumar" userId="f288574e5ad30b2c" providerId="LiveId" clId="{D533F85C-5BFA-4094-9BEF-19199FDCB1F0}" dt="2022-08-20T11:42:06.031" v="1159" actId="14861"/>
+          <ac:picMkLst>
+            <pc:docMk/>
+            <pc:sldMk cId="3556427862" sldId="256"/>
+            <ac:picMk id="5" creationId="{76D02D84-3968-E9F7-0449-78AF97BE85CF}"/>
+          </ac:picMkLst>
+        </pc:picChg>
+      </pc:sldChg>
+      <pc:sldChg chg="modSp mod">
+        <pc:chgData name="pavan kumar" userId="f288574e5ad30b2c" providerId="LiveId" clId="{D533F85C-5BFA-4094-9BEF-19199FDCB1F0}" dt="2022-08-20T10:49:00.843" v="801" actId="115"/>
+        <pc:sldMkLst>
+          <pc:docMk/>
+          <pc:sldMk cId="3475136661" sldId="257"/>
+        </pc:sldMkLst>
+        <pc:spChg chg="mod">
+          <ac:chgData name="pavan kumar" userId="f288574e5ad30b2c" providerId="LiveId" clId="{D533F85C-5BFA-4094-9BEF-19199FDCB1F0}" dt="2022-08-20T10:49:00.843" v="801" actId="115"/>
+          <ac:spMkLst>
+            <pc:docMk/>
+            <pc:sldMk cId="3475136661" sldId="257"/>
+            <ac:spMk id="2" creationId="{86D8CDD9-F0B5-9F29-71DA-FA5983B34C23}"/>
+          </ac:spMkLst>
+        </pc:spChg>
+      </pc:sldChg>
+      <pc:sldChg chg="modSp mod">
+        <pc:chgData name="pavan kumar" userId="f288574e5ad30b2c" providerId="LiveId" clId="{D533F85C-5BFA-4094-9BEF-19199FDCB1F0}" dt="2022-08-20T10:49:13.757" v="802" actId="115"/>
+        <pc:sldMkLst>
+          <pc:docMk/>
+          <pc:sldMk cId="1280277207" sldId="258"/>
+        </pc:sldMkLst>
+        <pc:spChg chg="mod">
+          <ac:chgData name="pavan kumar" userId="f288574e5ad30b2c" providerId="LiveId" clId="{D533F85C-5BFA-4094-9BEF-19199FDCB1F0}" dt="2022-08-20T10:49:13.757" v="802" actId="115"/>
+          <ac:spMkLst>
+            <pc:docMk/>
+            <pc:sldMk cId="1280277207" sldId="258"/>
+            <ac:spMk id="2" creationId="{FD434FF1-BA13-8828-388F-030BCE42EAD0}"/>
+          </ac:spMkLst>
+        </pc:spChg>
+      </pc:sldChg>
+      <pc:sldChg chg="modSp mod">
+        <pc:chgData name="pavan kumar" userId="f288574e5ad30b2c" providerId="LiveId" clId="{D533F85C-5BFA-4094-9BEF-19199FDCB1F0}" dt="2022-08-20T10:49:33.567" v="803" actId="115"/>
+        <pc:sldMkLst>
+          <pc:docMk/>
+          <pc:sldMk cId="74697639" sldId="259"/>
+        </pc:sldMkLst>
+        <pc:spChg chg="mod">
+          <ac:chgData name="pavan kumar" userId="f288574e5ad30b2c" providerId="LiveId" clId="{D533F85C-5BFA-4094-9BEF-19199FDCB1F0}" dt="2022-08-20T10:49:33.567" v="803" actId="115"/>
+          <ac:spMkLst>
+            <pc:docMk/>
+            <pc:sldMk cId="74697639" sldId="259"/>
+            <ac:spMk id="2" creationId="{79139D76-1B1E-15EC-2261-B0F845621638}"/>
+          </ac:spMkLst>
+        </pc:spChg>
+      </pc:sldChg>
+      <pc:sldChg chg="addSp delSp modSp mod">
+        <pc:chgData name="pavan kumar" userId="f288574e5ad30b2c" providerId="LiveId" clId="{D533F85C-5BFA-4094-9BEF-19199FDCB1F0}" dt="2022-08-20T10:58:30.868" v="832" actId="14100"/>
+        <pc:sldMkLst>
+          <pc:docMk/>
+          <pc:sldMk cId="3274181917" sldId="260"/>
+        </pc:sldMkLst>
+        <pc:spChg chg="add del mod">
+          <ac:chgData name="pavan kumar" userId="f288574e5ad30b2c" providerId="LiveId" clId="{D533F85C-5BFA-4094-9BEF-19199FDCB1F0}" dt="2022-08-20T10:56:09.161" v="813" actId="931"/>
+          <ac:spMkLst>
+            <pc:docMk/>
+            <pc:sldMk cId="3274181917" sldId="260"/>
+            <ac:spMk id="3" creationId="{9330A47F-2496-6D10-2538-7388522F4240}"/>
+          </ac:spMkLst>
+        </pc:spChg>
+        <pc:spChg chg="mod">
+          <ac:chgData name="pavan kumar" userId="f288574e5ad30b2c" providerId="LiveId" clId="{D533F85C-5BFA-4094-9BEF-19199FDCB1F0}" dt="2022-08-20T10:50:26.943" v="806" actId="14100"/>
+          <ac:spMkLst>
+            <pc:docMk/>
+            <pc:sldMk cId="3274181917" sldId="260"/>
+            <ac:spMk id="4" creationId="{313122CE-0453-E9EC-214B-1A375159760B}"/>
+          </ac:spMkLst>
+        </pc:spChg>
+        <pc:spChg chg="mod">
+          <ac:chgData name="pavan kumar" userId="f288574e5ad30b2c" providerId="LiveId" clId="{D533F85C-5BFA-4094-9BEF-19199FDCB1F0}" dt="2022-08-20T10:58:15.972" v="830" actId="27636"/>
+          <ac:spMkLst>
+            <pc:docMk/>
+            <pc:sldMk cId="3274181917" sldId="260"/>
+            <ac:spMk id="6" creationId="{AAFAF4DC-B32F-1079-FFAC-6FAA5529B7B6}"/>
+          </ac:spMkLst>
+        </pc:spChg>
+        <pc:spChg chg="del">
+          <ac:chgData name="pavan kumar" userId="f288574e5ad30b2c" providerId="LiveId" clId="{D533F85C-5BFA-4094-9BEF-19199FDCB1F0}" dt="2022-08-20T10:55:34.068" v="812" actId="21"/>
+          <ac:spMkLst>
+            <pc:docMk/>
+            <pc:sldMk cId="3274181917" sldId="260"/>
+            <ac:spMk id="16" creationId="{FCA61403-2DC4-3347-3C98-654680F336A8}"/>
+          </ac:spMkLst>
+        </pc:spChg>
+        <pc:picChg chg="add mod modCrop">
+          <ac:chgData name="pavan kumar" userId="f288574e5ad30b2c" providerId="LiveId" clId="{D533F85C-5BFA-4094-9BEF-19199FDCB1F0}" dt="2022-08-20T10:58:30.868" v="832" actId="14100"/>
+          <ac:picMkLst>
+            <pc:docMk/>
+            <pc:sldMk cId="3274181917" sldId="260"/>
+            <ac:picMk id="7" creationId="{BCFF631E-D0E1-DD5D-9625-8533343EC448}"/>
+          </ac:picMkLst>
+        </pc:picChg>
+        <pc:picChg chg="del mod">
+          <ac:chgData name="pavan kumar" userId="f288574e5ad30b2c" providerId="LiveId" clId="{D533F85C-5BFA-4094-9BEF-19199FDCB1F0}" dt="2022-08-20T10:55:34.068" v="812" actId="21"/>
+          <ac:picMkLst>
+            <pc:docMk/>
+            <pc:sldMk cId="3274181917" sldId="260"/>
+            <ac:picMk id="15" creationId="{2A54A08D-A748-EE8F-764C-909EA03E48EE}"/>
+          </ac:picMkLst>
+        </pc:picChg>
+      </pc:sldChg>
+      <pc:sldChg chg="addSp delSp modSp mod">
+        <pc:chgData name="pavan kumar" userId="f288574e5ad30b2c" providerId="LiveId" clId="{D533F85C-5BFA-4094-9BEF-19199FDCB1F0}" dt="2022-08-20T11:10:15.958" v="880" actId="115"/>
         <pc:sldMkLst>
           <pc:docMk/>
           <pc:sldMk cId="1733947948" sldId="261"/>
         </pc:sldMkLst>
-        <pc:picChg chg="mod">
-          <ac:chgData name="pavan kumar" userId="f288574e5ad30b2c" providerId="LiveId" clId="{D533F85C-5BFA-4094-9BEF-19199FDCB1F0}" dt="2022-08-19T09:28:06.156" v="1" actId="14100"/>
+        <pc:spChg chg="mod">
+          <ac:chgData name="pavan kumar" userId="f288574e5ad30b2c" providerId="LiveId" clId="{D533F85C-5BFA-4094-9BEF-19199FDCB1F0}" dt="2022-08-20T11:10:15.958" v="880" actId="115"/>
+          <ac:spMkLst>
+            <pc:docMk/>
+            <pc:sldMk cId="1733947948" sldId="261"/>
+            <ac:spMk id="5" creationId="{96A2417F-0CE8-157A-A8FA-B1FFCFB2A501}"/>
+          </ac:spMkLst>
+        </pc:spChg>
+        <pc:spChg chg="del">
+          <ac:chgData name="pavan kumar" userId="f288574e5ad30b2c" providerId="LiveId" clId="{D533F85C-5BFA-4094-9BEF-19199FDCB1F0}" dt="2022-08-20T11:00:00.740" v="855" actId="21"/>
+          <ac:spMkLst>
+            <pc:docMk/>
+            <pc:sldMk cId="1733947948" sldId="261"/>
+            <ac:spMk id="8" creationId="{9A7C1AF1-D12F-AA27-094A-F5FBCAD1848F}"/>
+          </ac:spMkLst>
+        </pc:spChg>
+        <pc:picChg chg="add mod modCrop">
+          <ac:chgData name="pavan kumar" userId="f288574e5ad30b2c" providerId="LiveId" clId="{D533F85C-5BFA-4094-9BEF-19199FDCB1F0}" dt="2022-08-20T11:09:45.907" v="879" actId="14100"/>
+          <ac:picMkLst>
+            <pc:docMk/>
+            <pc:sldMk cId="1733947948" sldId="261"/>
+            <ac:picMk id="3" creationId="{6BA6129D-3201-993D-5A75-84F867F8950D}"/>
+          </ac:picMkLst>
+        </pc:picChg>
+        <pc:picChg chg="del mod">
+          <ac:chgData name="pavan kumar" userId="f288574e5ad30b2c" providerId="LiveId" clId="{D533F85C-5BFA-4094-9BEF-19199FDCB1F0}" dt="2022-08-20T11:00:00.740" v="855" actId="21"/>
           <ac:picMkLst>
             <pc:docMk/>
             <pc:sldMk cId="1733947948" sldId="261"/>
             <ac:picMk id="7" creationId="{E6CC5016-46F5-8126-7C0F-5485F90B93B7}"/>
           </ac:picMkLst>
         </pc:picChg>
-        <pc:picChg chg="add mod modCrop">
-          <ac:chgData name="pavan kumar" userId="f288574e5ad30b2c" providerId="LiveId" clId="{D533F85C-5BFA-4094-9BEF-19199FDCB1F0}" dt="2022-08-19T09:30:23.830" v="15" actId="14100"/>
+        <pc:picChg chg="add del mod modCrop">
+          <ac:chgData name="pavan kumar" userId="f288574e5ad30b2c" providerId="LiveId" clId="{D533F85C-5BFA-4094-9BEF-19199FDCB1F0}" dt="2022-08-20T11:07:52.464" v="866" actId="21"/>
           <ac:picMkLst>
             <pc:docMk/>
             <pc:sldMk cId="1733947948" sldId="261"/>
@@ -165,14 +327,37 @@
           </ac:picMkLst>
         </pc:picChg>
       </pc:sldChg>
-      <pc:sldChg chg="addSp modSp mod">
-        <pc:chgData name="pavan kumar" userId="f288574e5ad30b2c" providerId="LiveId" clId="{D533F85C-5BFA-4094-9BEF-19199FDCB1F0}" dt="2022-08-19T09:42:24.762" v="81" actId="14100"/>
+      <pc:sldChg chg="modSp mod">
+        <pc:chgData name="pavan kumar" userId="f288574e5ad30b2c" providerId="LiveId" clId="{D533F85C-5BFA-4094-9BEF-19199FDCB1F0}" dt="2022-08-20T11:30:15.029" v="1064" actId="27636"/>
+        <pc:sldMkLst>
+          <pc:docMk/>
+          <pc:sldMk cId="2002984229" sldId="263"/>
+        </pc:sldMkLst>
+        <pc:spChg chg="mod">
+          <ac:chgData name="pavan kumar" userId="f288574e5ad30b2c" providerId="LiveId" clId="{D533F85C-5BFA-4094-9BEF-19199FDCB1F0}" dt="2022-08-20T11:30:07.603" v="1062" actId="14100"/>
+          <ac:spMkLst>
+            <pc:docMk/>
+            <pc:sldMk cId="2002984229" sldId="263"/>
+            <ac:spMk id="5" creationId="{E52B763D-F268-3B17-7B56-2818D6292D1C}"/>
+          </ac:spMkLst>
+        </pc:spChg>
+        <pc:spChg chg="mod">
+          <ac:chgData name="pavan kumar" userId="f288574e5ad30b2c" providerId="LiveId" clId="{D533F85C-5BFA-4094-9BEF-19199FDCB1F0}" dt="2022-08-20T11:30:15.029" v="1064" actId="27636"/>
+          <ac:spMkLst>
+            <pc:docMk/>
+            <pc:sldMk cId="2002984229" sldId="263"/>
+            <ac:spMk id="6" creationId="{C5F9665F-63A7-C645-C258-D547EBEFEDE4}"/>
+          </ac:spMkLst>
+        </pc:spChg>
+      </pc:sldChg>
+      <pc:sldChg chg="addSp delSp modSp mod">
+        <pc:chgData name="pavan kumar" userId="f288574e5ad30b2c" providerId="LiveId" clId="{D533F85C-5BFA-4094-9BEF-19199FDCB1F0}" dt="2022-08-20T11:30:56.997" v="1066" actId="14100"/>
         <pc:sldMkLst>
           <pc:docMk/>
           <pc:sldMk cId="1565147232" sldId="264"/>
         </pc:sldMkLst>
         <pc:spChg chg="mod">
-          <ac:chgData name="pavan kumar" userId="f288574e5ad30b2c" providerId="LiveId" clId="{D533F85C-5BFA-4094-9BEF-19199FDCB1F0}" dt="2022-08-19T09:41:33.688" v="73" actId="14100"/>
+          <ac:chgData name="pavan kumar" userId="f288574e5ad30b2c" providerId="LiveId" clId="{D533F85C-5BFA-4094-9BEF-19199FDCB1F0}" dt="2022-08-20T11:13:11.632" v="892" actId="115"/>
           <ac:spMkLst>
             <pc:docMk/>
             <pc:sldMk cId="1565147232" sldId="264"/>
@@ -180,15 +365,15 @@
           </ac:spMkLst>
         </pc:spChg>
         <pc:spChg chg="mod">
-          <ac:chgData name="pavan kumar" userId="f288574e5ad30b2c" providerId="LiveId" clId="{D533F85C-5BFA-4094-9BEF-19199FDCB1F0}" dt="2022-08-19T09:42:08.548" v="80" actId="27636"/>
+          <ac:chgData name="pavan kumar" userId="f288574e5ad30b2c" providerId="LiveId" clId="{D533F85C-5BFA-4094-9BEF-19199FDCB1F0}" dt="2022-08-20T11:30:56.997" v="1066" actId="14100"/>
           <ac:spMkLst>
             <pc:docMk/>
             <pc:sldMk cId="1565147232" sldId="264"/>
             <ac:spMk id="3" creationId="{933EB580-4E52-C11D-7FD7-DC2C09E2EFB7}"/>
           </ac:spMkLst>
         </pc:spChg>
-        <pc:picChg chg="add mod modCrop">
-          <ac:chgData name="pavan kumar" userId="f288574e5ad30b2c" providerId="LiveId" clId="{D533F85C-5BFA-4094-9BEF-19199FDCB1F0}" dt="2022-08-19T09:42:24.762" v="81" actId="14100"/>
+        <pc:picChg chg="add del mod modCrop">
+          <ac:chgData name="pavan kumar" userId="f288574e5ad30b2c" providerId="LiveId" clId="{D533F85C-5BFA-4094-9BEF-19199FDCB1F0}" dt="2022-08-20T11:10:46.150" v="881" actId="21"/>
           <ac:picMkLst>
             <pc:docMk/>
             <pc:sldMk cId="1565147232" sldId="264"/>
@@ -196,14 +381,45 @@
           </ac:picMkLst>
         </pc:picChg>
       </pc:sldChg>
+      <pc:sldChg chg="addSp delSp modSp mod">
+        <pc:chgData name="pavan kumar" userId="f288574e5ad30b2c" providerId="LiveId" clId="{D533F85C-5BFA-4094-9BEF-19199FDCB1F0}" dt="2022-08-20T11:23:40.704" v="952" actId="115"/>
+        <pc:sldMkLst>
+          <pc:docMk/>
+          <pc:sldMk cId="3384736115" sldId="265"/>
+        </pc:sldMkLst>
+        <pc:spChg chg="mod">
+          <ac:chgData name="pavan kumar" userId="f288574e5ad30b2c" providerId="LiveId" clId="{D533F85C-5BFA-4094-9BEF-19199FDCB1F0}" dt="2022-08-20T11:23:40.704" v="952" actId="115"/>
+          <ac:spMkLst>
+            <pc:docMk/>
+            <pc:sldMk cId="3384736115" sldId="265"/>
+            <ac:spMk id="4" creationId="{A2E67338-563A-E685-D860-ECFEA1AE59CE}"/>
+          </ac:spMkLst>
+        </pc:spChg>
+        <pc:picChg chg="add mod modCrop">
+          <ac:chgData name="pavan kumar" userId="f288574e5ad30b2c" providerId="LiveId" clId="{D533F85C-5BFA-4094-9BEF-19199FDCB1F0}" dt="2022-08-20T11:23:33.692" v="951" actId="14100"/>
+          <ac:picMkLst>
+            <pc:docMk/>
+            <pc:sldMk cId="3384736115" sldId="265"/>
+            <ac:picMk id="3" creationId="{4E3C0E62-660D-C400-B111-588A47724D84}"/>
+          </ac:picMkLst>
+        </pc:picChg>
+        <pc:picChg chg="del">
+          <ac:chgData name="pavan kumar" userId="f288574e5ad30b2c" providerId="LiveId" clId="{D533F85C-5BFA-4094-9BEF-19199FDCB1F0}" dt="2022-08-20T11:21:32.428" v="937" actId="21"/>
+          <ac:picMkLst>
+            <pc:docMk/>
+            <pc:sldMk cId="3384736115" sldId="265"/>
+            <ac:picMk id="1026" creationId="{B598D779-5CD8-46FB-66E5-3826302A5491}"/>
+          </ac:picMkLst>
+        </pc:picChg>
+      </pc:sldChg>
       <pc:sldChg chg="modSp mod">
-        <pc:chgData name="pavan kumar" userId="f288574e5ad30b2c" providerId="LiveId" clId="{D533F85C-5BFA-4094-9BEF-19199FDCB1F0}" dt="2022-08-19T09:43:47.910" v="94" actId="27636"/>
+        <pc:chgData name="pavan kumar" userId="f288574e5ad30b2c" providerId="LiveId" clId="{D533F85C-5BFA-4094-9BEF-19199FDCB1F0}" dt="2022-08-20T11:44:40.804" v="1163" actId="115"/>
         <pc:sldMkLst>
           <pc:docMk/>
           <pc:sldMk cId="1622510466" sldId="266"/>
         </pc:sldMkLst>
         <pc:spChg chg="mod">
-          <ac:chgData name="pavan kumar" userId="f288574e5ad30b2c" providerId="LiveId" clId="{D533F85C-5BFA-4094-9BEF-19199FDCB1F0}" dt="2022-08-19T09:43:24.981" v="89" actId="1076"/>
+          <ac:chgData name="pavan kumar" userId="f288574e5ad30b2c" providerId="LiveId" clId="{D533F85C-5BFA-4094-9BEF-19199FDCB1F0}" dt="2022-08-20T11:44:40.804" v="1163" actId="115"/>
           <ac:spMkLst>
             <pc:docMk/>
             <pc:sldMk cId="1622510466" sldId="266"/>
@@ -216,6 +432,36 @@
             <pc:docMk/>
             <pc:sldMk cId="1622510466" sldId="266"/>
             <ac:spMk id="4" creationId="{ACDD3353-E651-7102-89D1-24FCA115E611}"/>
+          </ac:spMkLst>
+        </pc:spChg>
+      </pc:sldChg>
+      <pc:sldChg chg="modSp mod">
+        <pc:chgData name="pavan kumar" userId="f288574e5ad30b2c" providerId="LiveId" clId="{D533F85C-5BFA-4094-9BEF-19199FDCB1F0}" dt="2022-08-20T11:44:20.424" v="1162" actId="115"/>
+        <pc:sldMkLst>
+          <pc:docMk/>
+          <pc:sldMk cId="1774433628" sldId="267"/>
+        </pc:sldMkLst>
+        <pc:spChg chg="mod">
+          <ac:chgData name="pavan kumar" userId="f288574e5ad30b2c" providerId="LiveId" clId="{D533F85C-5BFA-4094-9BEF-19199FDCB1F0}" dt="2022-08-20T11:44:20.424" v="1162" actId="115"/>
+          <ac:spMkLst>
+            <pc:docMk/>
+            <pc:sldMk cId="1774433628" sldId="267"/>
+            <ac:spMk id="4" creationId="{E13F3DF5-DD43-884B-45F4-6D50C7B1B244}"/>
+          </ac:spMkLst>
+        </pc:spChg>
+      </pc:sldChg>
+      <pc:sldChg chg="modSp mod">
+        <pc:chgData name="pavan kumar" userId="f288574e5ad30b2c" providerId="LiveId" clId="{D533F85C-5BFA-4094-9BEF-19199FDCB1F0}" dt="2022-08-20T11:44:10.143" v="1161" actId="115"/>
+        <pc:sldMkLst>
+          <pc:docMk/>
+          <pc:sldMk cId="2532149091" sldId="269"/>
+        </pc:sldMkLst>
+        <pc:spChg chg="mod">
+          <ac:chgData name="pavan kumar" userId="f288574e5ad30b2c" providerId="LiveId" clId="{D533F85C-5BFA-4094-9BEF-19199FDCB1F0}" dt="2022-08-20T11:44:10.143" v="1161" actId="115"/>
+          <ac:spMkLst>
+            <pc:docMk/>
+            <pc:sldMk cId="2532149091" sldId="269"/>
+            <ac:spMk id="3" creationId="{417DDE6D-77BE-4942-4637-2FECE1CB1364}"/>
           </ac:spMkLst>
         </pc:spChg>
       </pc:sldChg>
@@ -297,7 +543,7 @@
         </pc:picChg>
       </pc:sldChg>
       <pc:sldChg chg="addSp delSp modSp new mod modClrScheme chgLayout">
-        <pc:chgData name="pavan kumar" userId="f288574e5ad30b2c" providerId="LiveId" clId="{D533F85C-5BFA-4094-9BEF-19199FDCB1F0}" dt="2022-08-19T11:00:21.340" v="247" actId="27636"/>
+        <pc:chgData name="pavan kumar" userId="f288574e5ad30b2c" providerId="LiveId" clId="{D533F85C-5BFA-4094-9BEF-19199FDCB1F0}" dt="2022-08-20T11:25:18.396" v="989" actId="14100"/>
         <pc:sldMkLst>
           <pc:docMk/>
           <pc:sldMk cId="3235960110" sldId="273"/>
@@ -318,8 +564,8 @@
             <ac:spMk id="3" creationId="{13C9482B-D96A-F53C-E056-3B6C3A846161}"/>
           </ac:spMkLst>
         </pc:spChg>
-        <pc:spChg chg="add mod ord">
-          <ac:chgData name="pavan kumar" userId="f288574e5ad30b2c" providerId="LiveId" clId="{D533F85C-5BFA-4094-9BEF-19199FDCB1F0}" dt="2022-08-19T11:00:21.340" v="247" actId="27636"/>
+        <pc:spChg chg="add del mod ord">
+          <ac:chgData name="pavan kumar" userId="f288574e5ad30b2c" providerId="LiveId" clId="{D533F85C-5BFA-4094-9BEF-19199FDCB1F0}" dt="2022-08-20T11:25:05.334" v="987" actId="700"/>
           <ac:spMkLst>
             <pc:docMk/>
             <pc:sldMk cId="3235960110" sldId="273"/>
@@ -367,7 +613,7 @@
           </ac:spMkLst>
         </pc:spChg>
         <pc:picChg chg="add mod modCrop">
-          <ac:chgData name="pavan kumar" userId="f288574e5ad30b2c" providerId="LiveId" clId="{D533F85C-5BFA-4094-9BEF-19199FDCB1F0}" dt="2022-08-19T10:55:23.349" v="172" actId="14100"/>
+          <ac:chgData name="pavan kumar" userId="f288574e5ad30b2c" providerId="LiveId" clId="{D533F85C-5BFA-4094-9BEF-19199FDCB1F0}" dt="2022-08-20T11:25:12.924" v="988" actId="14100"/>
           <ac:picMkLst>
             <pc:docMk/>
             <pc:sldMk cId="3235960110" sldId="273"/>
@@ -375,7 +621,7 @@
           </ac:picMkLst>
         </pc:picChg>
         <pc:picChg chg="add mod modCrop">
-          <ac:chgData name="pavan kumar" userId="f288574e5ad30b2c" providerId="LiveId" clId="{D533F85C-5BFA-4094-9BEF-19199FDCB1F0}" dt="2022-08-19T10:55:32.811" v="174" actId="14100"/>
+          <ac:chgData name="pavan kumar" userId="f288574e5ad30b2c" providerId="LiveId" clId="{D533F85C-5BFA-4094-9BEF-19199FDCB1F0}" dt="2022-08-20T11:25:18.396" v="989" actId="14100"/>
           <ac:picMkLst>
             <pc:docMk/>
             <pc:sldMk cId="3235960110" sldId="273"/>
@@ -395,6 +641,68 @@
             <pc:docMk/>
             <pc:sldMk cId="819130434" sldId="274"/>
             <ac:picMk id="3" creationId="{40135595-31F5-2350-803B-E81023798D85}"/>
+          </ac:picMkLst>
+        </pc:picChg>
+      </pc:sldChg>
+      <pc:sldChg chg="addSp delSp modSp new mod">
+        <pc:chgData name="pavan kumar" userId="f288574e5ad30b2c" providerId="LiveId" clId="{D533F85C-5BFA-4094-9BEF-19199FDCB1F0}" dt="2022-08-20T11:16:55.817" v="936" actId="14100"/>
+        <pc:sldMkLst>
+          <pc:docMk/>
+          <pc:sldMk cId="1578610247" sldId="275"/>
+        </pc:sldMkLst>
+        <pc:spChg chg="mod">
+          <ac:chgData name="pavan kumar" userId="f288574e5ad30b2c" providerId="LiveId" clId="{D533F85C-5BFA-4094-9BEF-19199FDCB1F0}" dt="2022-08-20T11:15:22.778" v="924" actId="14100"/>
+          <ac:spMkLst>
+            <pc:docMk/>
+            <pc:sldMk cId="1578610247" sldId="275"/>
+            <ac:spMk id="2" creationId="{898357DE-3ED0-50BA-B43F-8F31A15DFFED}"/>
+          </ac:spMkLst>
+        </pc:spChg>
+        <pc:spChg chg="del">
+          <ac:chgData name="pavan kumar" userId="f288574e5ad30b2c" providerId="LiveId" clId="{D533F85C-5BFA-4094-9BEF-19199FDCB1F0}" dt="2022-08-20T11:14:49.152" v="919" actId="931"/>
+          <ac:spMkLst>
+            <pc:docMk/>
+            <pc:sldMk cId="1578610247" sldId="275"/>
+            <ac:spMk id="3" creationId="{B8A66D25-D608-F990-3352-C4D97C5B98FC}"/>
+          </ac:spMkLst>
+        </pc:spChg>
+        <pc:picChg chg="add mod modCrop">
+          <ac:chgData name="pavan kumar" userId="f288574e5ad30b2c" providerId="LiveId" clId="{D533F85C-5BFA-4094-9BEF-19199FDCB1F0}" dt="2022-08-20T11:16:55.817" v="936" actId="14100"/>
+          <ac:picMkLst>
+            <pc:docMk/>
+            <pc:sldMk cId="1578610247" sldId="275"/>
+            <ac:picMk id="5" creationId="{D588E12F-2F1F-1EDD-DDD1-2CAC04C12712}"/>
+          </ac:picMkLst>
+        </pc:picChg>
+      </pc:sldChg>
+      <pc:sldChg chg="addSp delSp modSp new mod">
+        <pc:chgData name="pavan kumar" userId="f288574e5ad30b2c" providerId="LiveId" clId="{D533F85C-5BFA-4094-9BEF-19199FDCB1F0}" dt="2022-08-20T11:28:45.970" v="1060" actId="20577"/>
+        <pc:sldMkLst>
+          <pc:docMk/>
+          <pc:sldMk cId="1596960295" sldId="276"/>
+        </pc:sldMkLst>
+        <pc:spChg chg="mod">
+          <ac:chgData name="pavan kumar" userId="f288574e5ad30b2c" providerId="LiveId" clId="{D533F85C-5BFA-4094-9BEF-19199FDCB1F0}" dt="2022-08-20T11:28:45.970" v="1060" actId="20577"/>
+          <ac:spMkLst>
+            <pc:docMk/>
+            <pc:sldMk cId="1596960295" sldId="276"/>
+            <ac:spMk id="2" creationId="{5A708903-03C5-D4C6-F5D0-D5D0D960B770}"/>
+          </ac:spMkLst>
+        </pc:spChg>
+        <pc:spChg chg="del">
+          <ac:chgData name="pavan kumar" userId="f288574e5ad30b2c" providerId="LiveId" clId="{D533F85C-5BFA-4094-9BEF-19199FDCB1F0}" dt="2022-08-20T11:26:54.390" v="1043" actId="931"/>
+          <ac:spMkLst>
+            <pc:docMk/>
+            <pc:sldMk cId="1596960295" sldId="276"/>
+            <ac:spMk id="3" creationId="{42D8A44A-669D-563E-D2E4-42773CDED69D}"/>
+          </ac:spMkLst>
+        </pc:spChg>
+        <pc:picChg chg="add mod modCrop">
+          <ac:chgData name="pavan kumar" userId="f288574e5ad30b2c" providerId="LiveId" clId="{D533F85C-5BFA-4094-9BEF-19199FDCB1F0}" dt="2022-08-20T11:28:31.750" v="1057" actId="14100"/>
+          <ac:picMkLst>
+            <pc:docMk/>
+            <pc:sldMk cId="1596960295" sldId="276"/>
+            <ac:picMk id="5" creationId="{42A7FF45-12F0-2846-0C6E-08B944024DE2}"/>
           </ac:picMkLst>
         </pc:picChg>
       </pc:sldChg>
@@ -542,7 +850,7 @@
           <a:p>
             <a:fld id="{2CFD22B6-826A-4E70-BA67-3434F760717C}" type="datetimeFigureOut">
               <a:rPr lang="en-IN" smtClean="0"/>
-              <a:t>19-08-2022</a:t>
+              <a:t>20-08-2022</a:t>
             </a:fld>
             <a:endParaRPr lang="en-IN"/>
           </a:p>
@@ -722,7 +1030,7 @@
           <a:p>
             <a:fld id="{2CFD22B6-826A-4E70-BA67-3434F760717C}" type="datetimeFigureOut">
               <a:rPr lang="en-IN" smtClean="0"/>
-              <a:t>19-08-2022</a:t>
+              <a:t>20-08-2022</a:t>
             </a:fld>
             <a:endParaRPr lang="en-IN"/>
           </a:p>
@@ -906,7 +1214,7 @@
           <a:p>
             <a:fld id="{2CFD22B6-826A-4E70-BA67-3434F760717C}" type="datetimeFigureOut">
               <a:rPr lang="en-IN" smtClean="0"/>
-              <a:t>19-08-2022</a:t>
+              <a:t>20-08-2022</a:t>
             </a:fld>
             <a:endParaRPr lang="en-IN"/>
           </a:p>
@@ -1076,7 +1384,7 @@
           <a:p>
             <a:fld id="{2CFD22B6-826A-4E70-BA67-3434F760717C}" type="datetimeFigureOut">
               <a:rPr lang="en-IN" smtClean="0"/>
-              <a:t>19-08-2022</a:t>
+              <a:t>20-08-2022</a:t>
             </a:fld>
             <a:endParaRPr lang="en-IN"/>
           </a:p>
@@ -1324,7 +1632,7 @@
           <a:p>
             <a:fld id="{2CFD22B6-826A-4E70-BA67-3434F760717C}" type="datetimeFigureOut">
               <a:rPr lang="en-IN" smtClean="0"/>
-              <a:t>19-08-2022</a:t>
+              <a:t>20-08-2022</a:t>
             </a:fld>
             <a:endParaRPr lang="en-IN"/>
           </a:p>
@@ -1561,7 +1869,7 @@
           <a:p>
             <a:fld id="{2CFD22B6-826A-4E70-BA67-3434F760717C}" type="datetimeFigureOut">
               <a:rPr lang="en-IN" smtClean="0"/>
-              <a:t>19-08-2022</a:t>
+              <a:t>20-08-2022</a:t>
             </a:fld>
             <a:endParaRPr lang="en-IN"/>
           </a:p>
@@ -1946,7 +2254,7 @@
           <a:p>
             <a:fld id="{2CFD22B6-826A-4E70-BA67-3434F760717C}" type="datetimeFigureOut">
               <a:rPr lang="en-IN" smtClean="0"/>
-              <a:t>19-08-2022</a:t>
+              <a:t>20-08-2022</a:t>
             </a:fld>
             <a:endParaRPr lang="en-IN"/>
           </a:p>
@@ -2064,7 +2372,7 @@
           <a:p>
             <a:fld id="{2CFD22B6-826A-4E70-BA67-3434F760717C}" type="datetimeFigureOut">
               <a:rPr lang="en-IN" smtClean="0"/>
-              <a:t>19-08-2022</a:t>
+              <a:t>20-08-2022</a:t>
             </a:fld>
             <a:endParaRPr lang="en-IN"/>
           </a:p>
@@ -2159,7 +2467,7 @@
           <a:p>
             <a:fld id="{2CFD22B6-826A-4E70-BA67-3434F760717C}" type="datetimeFigureOut">
               <a:rPr lang="en-IN" smtClean="0"/>
-              <a:t>19-08-2022</a:t>
+              <a:t>20-08-2022</a:t>
             </a:fld>
             <a:endParaRPr lang="en-IN"/>
           </a:p>
@@ -2410,7 +2718,7 @@
           <a:p>
             <a:fld id="{2CFD22B6-826A-4E70-BA67-3434F760717C}" type="datetimeFigureOut">
               <a:rPr lang="en-IN" smtClean="0"/>
-              <a:t>19-08-2022</a:t>
+              <a:t>20-08-2022</a:t>
             </a:fld>
             <a:endParaRPr lang="en-IN"/>
           </a:p>
@@ -2801,7 +3109,7 @@
           <a:p>
             <a:fld id="{2CFD22B6-826A-4E70-BA67-3434F760717C}" type="datetimeFigureOut">
               <a:rPr lang="en-IN" smtClean="0"/>
-              <a:t>19-08-2022</a:t>
+              <a:t>20-08-2022</a:t>
             </a:fld>
             <a:endParaRPr lang="en-IN"/>
           </a:p>
@@ -3019,7 +3327,7 @@
           <a:p>
             <a:fld id="{2CFD22B6-826A-4E70-BA67-3434F760717C}" type="datetimeFigureOut">
               <a:rPr lang="en-IN" smtClean="0"/>
-              <a:t>19-08-2022</a:t>
+              <a:t>20-08-2022</a:t>
             </a:fld>
             <a:endParaRPr lang="en-IN"/>
           </a:p>
@@ -3571,6 +3879,26 @@
 <file path=ppt/slides/slide1.xml><?xml version="1.0" encoding="utf-8"?>
 <p:sld xmlns:a="http://schemas.openxmlformats.org/drawingml/2006/main" xmlns:r="http://schemas.openxmlformats.org/officeDocument/2006/relationships" xmlns:p="http://schemas.openxmlformats.org/presentationml/2006/main">
   <p:cSld>
+    <p:bg>
+      <p:bgPr>
+        <a:gradFill rotWithShape="1">
+          <a:gsLst>
+            <a:gs pos="0">
+              <a:schemeClr val="bg1"/>
+            </a:gs>
+            <a:gs pos="100000">
+              <a:schemeClr val="bg1">
+                <a:shade val="80000"/>
+              </a:schemeClr>
+            </a:gs>
+          </a:gsLst>
+          <a:path path="circle">
+            <a:fillToRect l="43000" r="43000" b="100000"/>
+          </a:path>
+        </a:gradFill>
+        <a:effectLst/>
+      </p:bgPr>
+    </p:bg>
     <p:spTree>
       <p:nvGrpSpPr>
         <p:cNvPr id="1" name=""/>
@@ -3603,13 +3931,13 @@
         </p:nvSpPr>
         <p:spPr>
           <a:xfrm>
-            <a:off x="2590799" y="360218"/>
-            <a:ext cx="8077200" cy="2424546"/>
+            <a:off x="152400" y="193964"/>
+            <a:ext cx="11651671" cy="2590800"/>
           </a:xfrm>
         </p:spPr>
         <p:txBody>
           <a:bodyPr>
-            <a:normAutofit fontScale="90000"/>
+            <a:normAutofit/>
           </a:bodyPr>
           <a:lstStyle/>
           <a:p>
@@ -3619,7 +3947,7 @@
                   <a:srgbClr val="FF0000"/>
                 </a:solidFill>
               </a:rPr>
-              <a:t>Data Analytics Associate</a:t>
+              <a:t>                               Data Analytics Associate</a:t>
             </a:r>
             <a:br>
               <a:rPr lang="en-IN" sz="4000" dirty="0">
@@ -3634,7 +3962,7 @@
                   <a:srgbClr val="FF0000"/>
                 </a:solidFill>
               </a:rPr>
-              <a:t>final project</a:t>
+              <a:t>                               final project SUBMISSION</a:t>
             </a:r>
             <a:br>
               <a:rPr lang="en-IN" sz="4000" dirty="0">
@@ -3683,52 +4011,139 @@
         </p:nvSpPr>
         <p:spPr>
           <a:xfrm>
-            <a:off x="6096000" y="3602038"/>
-            <a:ext cx="4571999" cy="2133599"/>
-          </a:xfrm>
-        </p:spPr>
-        <p:txBody>
-          <a:bodyPr>
-            <a:normAutofit fontScale="92500" lnSpcReduction="10000"/>
+            <a:off x="401782" y="2992582"/>
+            <a:ext cx="11402290" cy="3061854"/>
+          </a:xfrm>
+          <a:effectLst>
+            <a:glow rad="127000">
+              <a:schemeClr val="accent6"/>
+            </a:glow>
+          </a:effectLst>
+        </p:spPr>
+        <p:txBody>
+          <a:bodyPr numCol="1">
+            <a:normAutofit lnSpcReduction="10000"/>
           </a:bodyPr>
           <a:lstStyle/>
           <a:p>
             <a:pPr algn="just"/>
             <a:r>
+              <a:rPr lang="en-IN" u="sng" dirty="0"/>
+              <a:t>SUBMITTED BY</a:t>
+            </a:r>
+            <a:r>
               <a:rPr lang="en-IN" dirty="0"/>
-              <a:t>Submitted by:</a:t>
+              <a:t>:</a:t>
             </a:r>
           </a:p>
           <a:p>
             <a:pPr algn="just"/>
             <a:r>
               <a:rPr lang="en-IN" dirty="0"/>
-              <a:t>Name: KILLANA PAVAN KUMAR</a:t>
+              <a:t>NAME: KILLANA PAVAN KUMAR</a:t>
             </a:r>
           </a:p>
           <a:p>
             <a:pPr algn="just"/>
             <a:r>
               <a:rPr lang="en-IN" dirty="0"/>
-              <a:t>Enrollment No: EBEON0322583426</a:t>
+              <a:t>ENROLLMENT NO:EBEON0322583426</a:t>
             </a:r>
           </a:p>
           <a:p>
             <a:pPr algn="just"/>
             <a:r>
               <a:rPr lang="en-IN" dirty="0"/>
-              <a:t>Batch No: 2021-7233</a:t>
+              <a:t>BATCH NO: 2021-7233</a:t>
             </a:r>
           </a:p>
           <a:p>
             <a:pPr algn="just"/>
             <a:r>
               <a:rPr lang="en-IN" dirty="0"/>
-              <a:t>Centre Name: Bangalore-EXL</a:t>
-            </a:r>
-          </a:p>
-        </p:txBody>
-      </p:sp>
+              <a:t>CENTRE NAME: BANGALORE-EXL</a:t>
+            </a:r>
+          </a:p>
+          <a:p>
+            <a:pPr algn="r"/>
+            <a:r>
+              <a:rPr lang="en-IN" u="sng" dirty="0"/>
+              <a:t>GUIDED BY</a:t>
+            </a:r>
+            <a:r>
+              <a:rPr lang="en-IN" dirty="0"/>
+              <a:t>: KARTHICK SIR</a:t>
+            </a:r>
+          </a:p>
+          <a:p>
+            <a:pPr algn="r"/>
+            <a:r>
+              <a:rPr lang="en-IN" dirty="0"/>
+              <a:t>FROM: EDUBRIDGE INDIA.COM</a:t>
+            </a:r>
+          </a:p>
+          <a:p>
+            <a:pPr algn="r"/>
+            <a:endParaRPr lang="en-IN" dirty="0"/>
+          </a:p>
+          <a:p>
+            <a:pPr algn="r"/>
+            <a:endParaRPr lang="en-IN" dirty="0"/>
+          </a:p>
+          <a:p>
+            <a:pPr algn="r"/>
+            <a:endParaRPr lang="en-IN" dirty="0"/>
+          </a:p>
+          <a:p>
+            <a:pPr algn="r"/>
+            <a:endParaRPr lang="en-IN" dirty="0"/>
+          </a:p>
+          <a:p>
+            <a:pPr algn="r"/>
+            <a:endParaRPr lang="en-IN" dirty="0"/>
+          </a:p>
+        </p:txBody>
+      </p:sp>
+      <p:pic>
+        <p:nvPicPr>
+          <p:cNvPr id="5" name="Picture 4">
+            <a:extLst>
+              <a:ext uri="{FF2B5EF4-FFF2-40B4-BE49-F238E27FC236}">
+                <a16:creationId xmlns:a16="http://schemas.microsoft.com/office/drawing/2014/main" id="{76D02D84-3968-E9F7-0449-78AF97BE85CF}"/>
+              </a:ext>
+            </a:extLst>
+          </p:cNvPr>
+          <p:cNvPicPr>
+            <a:picLocks noChangeAspect="1"/>
+          </p:cNvPicPr>
+          <p:nvPr/>
+        </p:nvPicPr>
+        <p:blipFill rotWithShape="1">
+          <a:blip r:embed="rId2">
+            <a:extLst>
+              <a:ext uri="{28A0092B-C50C-407E-A947-70E740481C1C}">
+                <a14:useLocalDpi xmlns:a14="http://schemas.microsoft.com/office/drawing/2010/main" val="0"/>
+              </a:ext>
+            </a:extLst>
+          </a:blip>
+          <a:srcRect l="15341" t="17217" r="56591" b="77290"/>
+          <a:stretch/>
+        </p:blipFill>
+        <p:spPr>
+          <a:xfrm>
+            <a:off x="138332" y="193964"/>
+            <a:ext cx="4059382" cy="1482436"/>
+          </a:xfrm>
+          <a:prstGeom prst="rect">
+            <a:avLst/>
+          </a:prstGeom>
+          <a:effectLst>
+            <a:glow rad="127000">
+              <a:srgbClr val="002060"/>
+            </a:glow>
+          </a:effectLst>
+        </p:spPr>
+      </p:pic>
     </p:spTree>
     <p:extLst>
       <p:ext uri="{BB962C8B-B14F-4D97-AF65-F5344CB8AC3E}">
@@ -3761,6 +4176,122 @@
       </p:grpSpPr>
       <p:sp>
         <p:nvSpPr>
+          <p:cNvPr id="2" name="Title 1">
+            <a:extLst>
+              <a:ext uri="{FF2B5EF4-FFF2-40B4-BE49-F238E27FC236}">
+                <a16:creationId xmlns:a16="http://schemas.microsoft.com/office/drawing/2014/main" id="{C035833B-4996-3B97-5EE6-51C33DB56FB3}"/>
+              </a:ext>
+            </a:extLst>
+          </p:cNvPr>
+          <p:cNvSpPr>
+            <a:spLocks noGrp="1"/>
+          </p:cNvSpPr>
+          <p:nvPr>
+            <p:ph type="title"/>
+          </p:nvPr>
+        </p:nvSpPr>
+        <p:spPr>
+          <a:xfrm>
+            <a:off x="1451579" y="346364"/>
+            <a:ext cx="9291215" cy="845126"/>
+          </a:xfrm>
+        </p:spPr>
+        <p:txBody>
+          <a:bodyPr>
+            <a:normAutofit/>
+          </a:bodyPr>
+          <a:lstStyle/>
+          <a:p>
+            <a:r>
+              <a:rPr lang="en-IN" u="sng" dirty="0"/>
+              <a:t>Exploratory data analysis</a:t>
+            </a:r>
+            <a:r>
+              <a:rPr lang="en-IN" dirty="0"/>
+              <a:t>:</a:t>
+            </a:r>
+          </a:p>
+        </p:txBody>
+      </p:sp>
+      <p:sp>
+        <p:nvSpPr>
+          <p:cNvPr id="3" name="Content Placeholder 2">
+            <a:extLst>
+              <a:ext uri="{FF2B5EF4-FFF2-40B4-BE49-F238E27FC236}">
+                <a16:creationId xmlns:a16="http://schemas.microsoft.com/office/drawing/2014/main" id="{933EB580-4E52-C11D-7FD7-DC2C09E2EFB7}"/>
+              </a:ext>
+            </a:extLst>
+          </p:cNvPr>
+          <p:cNvSpPr>
+            <a:spLocks noGrp="1"/>
+          </p:cNvSpPr>
+          <p:nvPr>
+            <p:ph idx="1"/>
+          </p:nvPr>
+        </p:nvSpPr>
+        <p:spPr>
+          <a:xfrm>
+            <a:off x="665018" y="1468582"/>
+            <a:ext cx="10820400" cy="4239491"/>
+          </a:xfrm>
+        </p:spPr>
+        <p:txBody>
+          <a:bodyPr>
+            <a:normAutofit/>
+          </a:bodyPr>
+          <a:lstStyle/>
+          <a:p>
+            <a:r>
+              <a:rPr lang="en-IN" dirty="0"/>
+              <a:t>With Exploratory data analysis we can able to understand our data in better way.</a:t>
+            </a:r>
+          </a:p>
+          <a:p>
+            <a:r>
+              <a:rPr lang="en-IN" dirty="0"/>
+              <a:t>Here we can find out data distribution, relationship between the variables.</a:t>
+            </a:r>
+          </a:p>
+          <a:p>
+            <a:r>
+              <a:rPr lang="en-IN" dirty="0"/>
+              <a:t>Also we have performed various visualization plots in finding the relationship between them like histogram ,point plot, scatter plot, box plot, regression plot etc.</a:t>
+            </a:r>
+          </a:p>
+        </p:txBody>
+      </p:sp>
+    </p:spTree>
+    <p:extLst>
+      <p:ext uri="{BB962C8B-B14F-4D97-AF65-F5344CB8AC3E}">
+        <p14:creationId xmlns:p14="http://schemas.microsoft.com/office/powerpoint/2010/main" val="1565147232"/>
+      </p:ext>
+    </p:extLst>
+  </p:cSld>
+  <p:clrMapOvr>
+    <a:masterClrMapping/>
+  </p:clrMapOvr>
+</p:sld>
+</file>
+
+<file path=ppt/slides/slide11.xml><?xml version="1.0" encoding="utf-8"?>
+<p:sld xmlns:a="http://schemas.openxmlformats.org/drawingml/2006/main" xmlns:r="http://schemas.openxmlformats.org/officeDocument/2006/relationships" xmlns:p="http://schemas.openxmlformats.org/presentationml/2006/main">
+  <p:cSld>
+    <p:spTree>
+      <p:nvGrpSpPr>
+        <p:cNvPr id="1" name=""/>
+        <p:cNvGrpSpPr/>
+        <p:nvPr/>
+      </p:nvGrpSpPr>
+      <p:grpSpPr>
+        <a:xfrm>
+          <a:off x="0" y="0"/>
+          <a:ext cx="0" cy="0"/>
+          <a:chOff x="0" y="0"/>
+          <a:chExt cx="0" cy="0"/>
+        </a:xfrm>
+      </p:grpSpPr>
+      <p:sp>
+        <p:nvSpPr>
           <p:cNvPr id="4" name="Title 3">
             <a:extLst>
               <a:ext uri="{FF2B5EF4-FFF2-40B4-BE49-F238E27FC236}">
@@ -3778,7 +4309,7 @@
         <p:spPr>
           <a:xfrm>
             <a:off x="1451579" y="235528"/>
-            <a:ext cx="9291215" cy="900546"/>
+            <a:ext cx="9291215" cy="651163"/>
           </a:xfrm>
         </p:spPr>
         <p:txBody>
@@ -3786,27 +4317,31 @@
           <a:lstStyle/>
           <a:p>
             <a:r>
+              <a:rPr lang="en-IN" u="sng" dirty="0"/>
+              <a:t>Data visualization</a:t>
+            </a:r>
+            <a:r>
               <a:rPr lang="en-IN" dirty="0"/>
-              <a:t>Data visualization:</a:t>
+              <a:t>:</a:t>
             </a:r>
           </a:p>
         </p:txBody>
       </p:sp>
       <p:pic>
         <p:nvPicPr>
-          <p:cNvPr id="1026" name="Picture 2" descr="Representation of Histograms for Diabetes dataset | Download Scientific  Diagram">
+          <p:cNvPr id="3" name="Picture 2">
             <a:extLst>
               <a:ext uri="{FF2B5EF4-FFF2-40B4-BE49-F238E27FC236}">
-                <a16:creationId xmlns:a16="http://schemas.microsoft.com/office/drawing/2014/main" id="{B598D779-5CD8-46FB-66E5-3826302A5491}"/>
+                <a16:creationId xmlns:a16="http://schemas.microsoft.com/office/drawing/2014/main" id="{4E3C0E62-660D-C400-B111-588A47724D84}"/>
               </a:ext>
             </a:extLst>
           </p:cNvPr>
           <p:cNvPicPr>
-            <a:picLocks noChangeAspect="1" noChangeArrowheads="1"/>
+            <a:picLocks noChangeAspect="1"/>
           </p:cNvPicPr>
           <p:nvPr/>
         </p:nvPicPr>
-        <p:blipFill>
+        <p:blipFill rotWithShape="1">
           <a:blip r:embed="rId2">
             <a:extLst>
               <a:ext uri="{28A0092B-C50C-407E-A947-70E740481C1C}">
@@ -3814,29 +4349,17 @@
               </a:ext>
             </a:extLst>
           </a:blip>
-          <a:srcRect/>
-          <a:stretch>
-            <a:fillRect/>
-          </a:stretch>
+          <a:srcRect l="6855" t="9117" r="6146" b="5983"/>
+          <a:stretch/>
         </p:blipFill>
-        <p:spPr bwMode="auto">
-          <a:xfrm>
-            <a:off x="235526" y="1136074"/>
-            <a:ext cx="11859491" cy="4890653"/>
+        <p:spPr>
+          <a:xfrm>
+            <a:off x="0" y="1094509"/>
+            <a:ext cx="12192000" cy="4613564"/>
           </a:xfrm>
           <a:prstGeom prst="rect">
             <a:avLst/>
           </a:prstGeom>
-          <a:noFill/>
-          <a:extLst>
-            <a:ext uri="{909E8E84-426E-40DD-AFC4-6F175D3DCCD1}">
-              <a14:hiddenFill xmlns:a14="http://schemas.microsoft.com/office/drawing/2010/main">
-                <a:solidFill>
-                  <a:srgbClr val="FFFFFF"/>
-                </a:solidFill>
-              </a14:hiddenFill>
-            </a:ext>
-          </a:extLst>
         </p:spPr>
       </p:pic>
     </p:spTree>
@@ -3852,7 +4375,7 @@
 </p:sld>
 </file>
 
-<file path=ppt/slides/slide11.xml><?xml version="1.0" encoding="utf-8"?>
+<file path=ppt/slides/slide12.xml><?xml version="1.0" encoding="utf-8"?>
 <p:sld xmlns:a="http://schemas.openxmlformats.org/drawingml/2006/main" xmlns:r="http://schemas.openxmlformats.org/officeDocument/2006/relationships" xmlns:p="http://schemas.openxmlformats.org/presentationml/2006/main">
   <p:cSld>
     <p:spTree>
@@ -3952,7 +4475,7 @@
 </p:sld>
 </file>
 
-<file path=ppt/slides/slide12.xml><?xml version="1.0" encoding="utf-8"?>
+<file path=ppt/slides/slide13.xml><?xml version="1.0" encoding="utf-8"?>
 <p:sld xmlns:a="http://schemas.openxmlformats.org/drawingml/2006/main" xmlns:r="http://schemas.openxmlformats.org/officeDocument/2006/relationships" xmlns:p="http://schemas.openxmlformats.org/presentationml/2006/main">
   <p:cSld>
     <p:spTree>
@@ -3996,7 +4519,7 @@
           <a:lstStyle/>
           <a:p>
             <a:r>
-              <a:rPr lang="en-IN" dirty="0"/>
+              <a:rPr lang="en-IN" u="sng" dirty="0"/>
               <a:t>Tools and models used:</a:t>
             </a:r>
           </a:p>
@@ -4113,7 +4636,104 @@
 </p:sld>
 </file>
 
-<file path=ppt/slides/slide13.xml><?xml version="1.0" encoding="utf-8"?>
+<file path=ppt/slides/slide14.xml><?xml version="1.0" encoding="utf-8"?>
+<p:sld xmlns:a="http://schemas.openxmlformats.org/drawingml/2006/main" xmlns:r="http://schemas.openxmlformats.org/officeDocument/2006/relationships" xmlns:p="http://schemas.openxmlformats.org/presentationml/2006/main">
+  <p:cSld>
+    <p:spTree>
+      <p:nvGrpSpPr>
+        <p:cNvPr id="1" name=""/>
+        <p:cNvGrpSpPr/>
+        <p:nvPr/>
+      </p:nvGrpSpPr>
+      <p:grpSpPr>
+        <a:xfrm>
+          <a:off x="0" y="0"/>
+          <a:ext cx="0" cy="0"/>
+          <a:chOff x="0" y="0"/>
+          <a:chExt cx="0" cy="0"/>
+        </a:xfrm>
+      </p:grpSpPr>
+      <p:sp>
+        <p:nvSpPr>
+          <p:cNvPr id="2" name="Title 1">
+            <a:extLst>
+              <a:ext uri="{FF2B5EF4-FFF2-40B4-BE49-F238E27FC236}">
+                <a16:creationId xmlns:a16="http://schemas.microsoft.com/office/drawing/2014/main" id="{5A708903-03C5-D4C6-F5D0-D5D0D960B770}"/>
+              </a:ext>
+            </a:extLst>
+          </p:cNvPr>
+          <p:cNvSpPr>
+            <a:spLocks noGrp="1"/>
+          </p:cNvSpPr>
+          <p:nvPr>
+            <p:ph type="title"/>
+          </p:nvPr>
+        </p:nvSpPr>
+        <p:spPr>
+          <a:xfrm>
+            <a:off x="1451579" y="304801"/>
+            <a:ext cx="9291215" cy="831272"/>
+          </a:xfrm>
+        </p:spPr>
+        <p:txBody>
+          <a:bodyPr/>
+          <a:lstStyle/>
+          <a:p>
+            <a:r>
+              <a:rPr lang="en-IN" u="sng" dirty="0"/>
+              <a:t>Accuracy score of multiple ml models:</a:t>
+            </a:r>
+          </a:p>
+        </p:txBody>
+      </p:sp>
+      <p:pic>
+        <p:nvPicPr>
+          <p:cNvPr id="5" name="Content Placeholder 4">
+            <a:extLst>
+              <a:ext uri="{FF2B5EF4-FFF2-40B4-BE49-F238E27FC236}">
+                <a16:creationId xmlns:a16="http://schemas.microsoft.com/office/drawing/2014/main" id="{42A7FF45-12F0-2846-0C6E-08B944024DE2}"/>
+              </a:ext>
+            </a:extLst>
+          </p:cNvPr>
+          <p:cNvPicPr>
+            <a:picLocks noGrp="1" noChangeAspect="1"/>
+          </p:cNvPicPr>
+          <p:nvPr>
+            <p:ph idx="1"/>
+          </p:nvPr>
+        </p:nvPicPr>
+        <p:blipFill rotWithShape="1">
+          <a:blip r:embed="rId2">
+            <a:extLst>
+              <a:ext uri="{28A0092B-C50C-407E-A947-70E740481C1C}">
+                <a14:useLocalDpi xmlns:a14="http://schemas.microsoft.com/office/drawing/2010/main" val="0"/>
+              </a:ext>
+            </a:extLst>
+          </a:blip>
+          <a:srcRect l="5797" t="8640" r="36836" b="13923"/>
+          <a:stretch/>
+        </p:blipFill>
+        <p:spPr>
+          <a:xfrm>
+            <a:off x="0" y="1136073"/>
+            <a:ext cx="12192000" cy="4724400"/>
+          </a:xfrm>
+        </p:spPr>
+      </p:pic>
+    </p:spTree>
+    <p:extLst>
+      <p:ext uri="{BB962C8B-B14F-4D97-AF65-F5344CB8AC3E}">
+        <p14:creationId xmlns:p14="http://schemas.microsoft.com/office/powerpoint/2010/main" val="1596960295"/>
+      </p:ext>
+    </p:extLst>
+  </p:cSld>
+  <p:clrMapOvr>
+    <a:masterClrMapping/>
+  </p:clrMapOvr>
+</p:sld>
+</file>
+
+<file path=ppt/slides/slide15.xml><?xml version="1.0" encoding="utf-8"?>
 <p:sld xmlns:a="http://schemas.openxmlformats.org/drawingml/2006/main" xmlns:r="http://schemas.openxmlformats.org/officeDocument/2006/relationships" xmlns:p="http://schemas.openxmlformats.org/presentationml/2006/main">
   <p:cSld>
     <p:spTree>
@@ -4157,8 +4777,8 @@
         </p:blipFill>
         <p:spPr>
           <a:xfrm>
-            <a:off x="235527" y="900544"/>
-            <a:ext cx="5763491" cy="5056911"/>
+            <a:off x="235527" y="471056"/>
+            <a:ext cx="5763491" cy="5486400"/>
           </a:xfrm>
           <a:prstGeom prst="rect">
             <a:avLst/>
@@ -4192,49 +4812,14 @@
         </p:blipFill>
         <p:spPr>
           <a:xfrm>
-            <a:off x="6345382" y="900544"/>
-            <a:ext cx="5611091" cy="5056911"/>
+            <a:off x="6345382" y="471056"/>
+            <a:ext cx="5611091" cy="5486400"/>
           </a:xfrm>
           <a:prstGeom prst="rect">
             <a:avLst/>
           </a:prstGeom>
         </p:spPr>
       </p:pic>
-      <p:sp>
-        <p:nvSpPr>
-          <p:cNvPr id="8" name="Title 7">
-            <a:extLst>
-              <a:ext uri="{FF2B5EF4-FFF2-40B4-BE49-F238E27FC236}">
-                <a16:creationId xmlns:a16="http://schemas.microsoft.com/office/drawing/2014/main" id="{616DF360-6EEF-1B0B-3868-5F55309BC54F}"/>
-              </a:ext>
-            </a:extLst>
-          </p:cNvPr>
-          <p:cNvSpPr>
-            <a:spLocks noGrp="1"/>
-          </p:cNvSpPr>
-          <p:nvPr>
-            <p:ph type="title"/>
-          </p:nvPr>
-        </p:nvSpPr>
-        <p:spPr>
-          <a:xfrm>
-            <a:off x="1451579" y="193965"/>
-            <a:ext cx="9291215" cy="471053"/>
-          </a:xfrm>
-        </p:spPr>
-        <p:txBody>
-          <a:bodyPr>
-            <a:normAutofit fontScale="90000"/>
-          </a:bodyPr>
-          <a:lstStyle/>
-          <a:p>
-            <a:r>
-              <a:rPr lang="en-IN" dirty="0"/>
-              <a:t>ACCURACY SCORE OF DIFFERENT MODEL:</a:t>
-            </a:r>
-          </a:p>
-        </p:txBody>
-      </p:sp>
     </p:spTree>
     <p:extLst>
       <p:ext uri="{BB962C8B-B14F-4D97-AF65-F5344CB8AC3E}">
@@ -4248,7 +4833,7 @@
 </p:sld>
 </file>
 
-<file path=ppt/slides/slide14.xml><?xml version="1.0" encoding="utf-8"?>
+<file path=ppt/slides/slide16.xml><?xml version="1.0" encoding="utf-8"?>
 <p:sld xmlns:a="http://schemas.openxmlformats.org/drawingml/2006/main" xmlns:r="http://schemas.openxmlformats.org/officeDocument/2006/relationships" xmlns:p="http://schemas.openxmlformats.org/presentationml/2006/main">
   <p:cSld>
     <p:spTree>
@@ -4313,7 +4898,7 @@
 </p:sld>
 </file>
 
-<file path=ppt/slides/slide15.xml><?xml version="1.0" encoding="utf-8"?>
+<file path=ppt/slides/slide17.xml><?xml version="1.0" encoding="utf-8"?>
 <p:sld xmlns:a="http://schemas.openxmlformats.org/drawingml/2006/main" xmlns:r="http://schemas.openxmlformats.org/officeDocument/2006/relationships" xmlns:p="http://schemas.openxmlformats.org/presentationml/2006/main">
   <p:cSld>
     <p:spTree>
@@ -4378,7 +4963,7 @@
 </p:sld>
 </file>
 
-<file path=ppt/slides/slide16.xml><?xml version="1.0" encoding="utf-8"?>
+<file path=ppt/slides/slide18.xml><?xml version="1.0" encoding="utf-8"?>
 <p:sld xmlns:a="http://schemas.openxmlformats.org/drawingml/2006/main" xmlns:r="http://schemas.openxmlformats.org/officeDocument/2006/relationships" xmlns:p="http://schemas.openxmlformats.org/presentationml/2006/main">
   <p:cSld>
     <p:spTree>
@@ -4443,7 +5028,7 @@
 </p:sld>
 </file>
 
-<file path=ppt/slides/slide17.xml><?xml version="1.0" encoding="utf-8"?>
+<file path=ppt/slides/slide19.xml><?xml version="1.0" encoding="utf-8"?>
 <p:sld xmlns:a="http://schemas.openxmlformats.org/drawingml/2006/main" xmlns:r="http://schemas.openxmlformats.org/officeDocument/2006/relationships" xmlns:p="http://schemas.openxmlformats.org/presentationml/2006/main">
   <p:cSld>
     <p:spTree>
@@ -4487,7 +5072,7 @@
           <a:lstStyle/>
           <a:p>
             <a:r>
-              <a:rPr lang="en-IN" dirty="0"/>
+              <a:rPr lang="en-IN" u="sng" dirty="0"/>
               <a:t>Output values:</a:t>
             </a:r>
           </a:p>
@@ -4576,202 +5161,6 @@
 </p:sld>
 </file>
 
-<file path=ppt/slides/slide18.xml><?xml version="1.0" encoding="utf-8"?>
-<p:sld xmlns:a="http://schemas.openxmlformats.org/drawingml/2006/main" xmlns:r="http://schemas.openxmlformats.org/officeDocument/2006/relationships" xmlns:p="http://schemas.openxmlformats.org/presentationml/2006/main">
-  <p:cSld>
-    <p:spTree>
-      <p:nvGrpSpPr>
-        <p:cNvPr id="1" name=""/>
-        <p:cNvGrpSpPr/>
-        <p:nvPr/>
-      </p:nvGrpSpPr>
-      <p:grpSpPr>
-        <a:xfrm>
-          <a:off x="0" y="0"/>
-          <a:ext cx="0" cy="0"/>
-          <a:chOff x="0" y="0"/>
-          <a:chExt cx="0" cy="0"/>
-        </a:xfrm>
-      </p:grpSpPr>
-      <p:sp>
-        <p:nvSpPr>
-          <p:cNvPr id="3" name="Title 2">
-            <a:extLst>
-              <a:ext uri="{FF2B5EF4-FFF2-40B4-BE49-F238E27FC236}">
-                <a16:creationId xmlns:a16="http://schemas.microsoft.com/office/drawing/2014/main" id="{417DDE6D-77BE-4942-4637-2FECE1CB1364}"/>
-              </a:ext>
-            </a:extLst>
-          </p:cNvPr>
-          <p:cNvSpPr>
-            <a:spLocks noGrp="1"/>
-          </p:cNvSpPr>
-          <p:nvPr>
-            <p:ph type="title"/>
-          </p:nvPr>
-        </p:nvSpPr>
-        <p:spPr>
-          <a:xfrm>
-            <a:off x="1451579" y="540327"/>
-            <a:ext cx="9291215" cy="983673"/>
-          </a:xfrm>
-        </p:spPr>
-        <p:txBody>
-          <a:bodyPr/>
-          <a:lstStyle/>
-          <a:p>
-            <a:r>
-              <a:rPr lang="en-IN" dirty="0"/>
-              <a:t>Conclusion:</a:t>
-            </a:r>
-          </a:p>
-        </p:txBody>
-      </p:sp>
-      <p:sp>
-        <p:nvSpPr>
-          <p:cNvPr id="4" name="Content Placeholder 3">
-            <a:extLst>
-              <a:ext uri="{FF2B5EF4-FFF2-40B4-BE49-F238E27FC236}">
-                <a16:creationId xmlns:a16="http://schemas.microsoft.com/office/drawing/2014/main" id="{9AC36FDC-B3BD-128E-167D-515D438144C6}"/>
-              </a:ext>
-            </a:extLst>
-          </p:cNvPr>
-          <p:cNvSpPr>
-            <a:spLocks noGrp="1"/>
-          </p:cNvSpPr>
-          <p:nvPr>
-            <p:ph idx="1"/>
-          </p:nvPr>
-        </p:nvSpPr>
-        <p:spPr>
-          <a:xfrm>
-            <a:off x="1451579" y="1634836"/>
-            <a:ext cx="9291215" cy="3831509"/>
-          </a:xfrm>
-        </p:spPr>
-        <p:txBody>
-          <a:bodyPr/>
-          <a:lstStyle/>
-          <a:p>
-            <a:r>
-              <a:rPr lang="en-IN" dirty="0"/>
-              <a:t>From this project we have predicted people suffering from diabetes disease using multiple Machine Learning models and developed the best intelligent system for prediction based on their accuracy score.</a:t>
-            </a:r>
-          </a:p>
-          <a:p>
-            <a:r>
-              <a:rPr lang="en-IN" dirty="0"/>
-              <a:t>Individually Logistic Regression giving us the best accuracy score about 75% but after using Stacking one of the Ensemble technique giving us accuracy score about 81% in predicting the diabetes disease correctly.</a:t>
-            </a:r>
-          </a:p>
-          <a:p>
-            <a:r>
-              <a:rPr lang="en-IN" dirty="0"/>
-              <a:t>So, we can conclude that Stacking is the best Machine Learning model in predicting the diabetes disease correctly with an accuracy score of 81%.</a:t>
-            </a:r>
-          </a:p>
-        </p:txBody>
-      </p:sp>
-    </p:spTree>
-    <p:extLst>
-      <p:ext uri="{BB962C8B-B14F-4D97-AF65-F5344CB8AC3E}">
-        <p14:creationId xmlns:p14="http://schemas.microsoft.com/office/powerpoint/2010/main" val="2532149091"/>
-      </p:ext>
-    </p:extLst>
-  </p:cSld>
-  <p:clrMapOvr>
-    <a:masterClrMapping/>
-  </p:clrMapOvr>
-</p:sld>
-</file>
-
-<file path=ppt/slides/slide19.xml><?xml version="1.0" encoding="utf-8"?>
-<p:sld xmlns:a="http://schemas.openxmlformats.org/drawingml/2006/main" xmlns:r="http://schemas.openxmlformats.org/officeDocument/2006/relationships" xmlns:p="http://schemas.openxmlformats.org/presentationml/2006/main">
-  <p:cSld>
-    <p:spTree>
-      <p:nvGrpSpPr>
-        <p:cNvPr id="1" name=""/>
-        <p:cNvGrpSpPr/>
-        <p:nvPr/>
-      </p:nvGrpSpPr>
-      <p:grpSpPr>
-        <a:xfrm>
-          <a:off x="0" y="0"/>
-          <a:ext cx="0" cy="0"/>
-          <a:chOff x="0" y="0"/>
-          <a:chExt cx="0" cy="0"/>
-        </a:xfrm>
-      </p:grpSpPr>
-      <p:sp>
-        <p:nvSpPr>
-          <p:cNvPr id="2" name="Title 1">
-            <a:extLst>
-              <a:ext uri="{FF2B5EF4-FFF2-40B4-BE49-F238E27FC236}">
-                <a16:creationId xmlns:a16="http://schemas.microsoft.com/office/drawing/2014/main" id="{89E4BE97-78DD-D75A-AAAC-FCCFF7E18141}"/>
-              </a:ext>
-            </a:extLst>
-          </p:cNvPr>
-          <p:cNvSpPr>
-            <a:spLocks noGrp="1"/>
-          </p:cNvSpPr>
-          <p:nvPr>
-            <p:ph type="title"/>
-          </p:nvPr>
-        </p:nvSpPr>
-        <p:spPr>
-          <a:xfrm>
-            <a:off x="1451579" y="804519"/>
-            <a:ext cx="9291215" cy="3545808"/>
-          </a:xfrm>
-        </p:spPr>
-        <p:txBody>
-          <a:bodyPr>
-            <a:normAutofit/>
-          </a:bodyPr>
-          <a:lstStyle/>
-          <a:p>
-            <a:r>
-              <a:rPr lang="en-IN" dirty="0"/>
-              <a:t>Thank you</a:t>
-            </a:r>
-            <a:br>
-              <a:rPr lang="en-IN" dirty="0"/>
-            </a:br>
-            <a:br>
-              <a:rPr lang="en-IN" dirty="0"/>
-            </a:br>
-            <a:br>
-              <a:rPr lang="en-IN" dirty="0"/>
-            </a:br>
-            <a:br>
-              <a:rPr lang="en-IN" dirty="0"/>
-            </a:br>
-            <a:r>
-              <a:rPr lang="en-IN" sz="2400" dirty="0"/>
-              <a:t>Any queries are welcomed</a:t>
-            </a:r>
-            <a:br>
-              <a:rPr lang="en-IN" dirty="0"/>
-            </a:br>
-            <a:br>
-              <a:rPr lang="en-IN" dirty="0"/>
-            </a:br>
-            <a:endParaRPr lang="en-IN" dirty="0"/>
-          </a:p>
-        </p:txBody>
-      </p:sp>
-    </p:spTree>
-    <p:extLst>
-      <p:ext uri="{BB962C8B-B14F-4D97-AF65-F5344CB8AC3E}">
-        <p14:creationId xmlns:p14="http://schemas.microsoft.com/office/powerpoint/2010/main" val="3738089362"/>
-      </p:ext>
-    </p:extLst>
-  </p:cSld>
-  <p:clrMapOvr>
-    <a:masterClrMapping/>
-  </p:clrMapOvr>
-</p:sld>
-</file>
-
 <file path=ppt/slides/slide2.xml><?xml version="1.0" encoding="utf-8"?>
 <p:sld xmlns:a="http://schemas.openxmlformats.org/drawingml/2006/main" xmlns:r="http://schemas.openxmlformats.org/officeDocument/2006/relationships" xmlns:p="http://schemas.openxmlformats.org/presentationml/2006/main">
   <p:cSld>
@@ -4816,8 +5205,12 @@
           <a:lstStyle/>
           <a:p>
             <a:r>
+              <a:rPr lang="en-IN" u="sng" dirty="0"/>
+              <a:t>Contents</a:t>
+            </a:r>
+            <a:r>
               <a:rPr lang="en-IN" dirty="0"/>
-              <a:t>Contents:</a:t>
+              <a:t>:</a:t>
             </a:r>
           </a:p>
         </p:txBody>
@@ -4927,6 +5320,206 @@
     <p:extLst>
       <p:ext uri="{BB962C8B-B14F-4D97-AF65-F5344CB8AC3E}">
         <p14:creationId xmlns:p14="http://schemas.microsoft.com/office/powerpoint/2010/main" val="3475136661"/>
+      </p:ext>
+    </p:extLst>
+  </p:cSld>
+  <p:clrMapOvr>
+    <a:masterClrMapping/>
+  </p:clrMapOvr>
+</p:sld>
+</file>
+
+<file path=ppt/slides/slide20.xml><?xml version="1.0" encoding="utf-8"?>
+<p:sld xmlns:a="http://schemas.openxmlformats.org/drawingml/2006/main" xmlns:r="http://schemas.openxmlformats.org/officeDocument/2006/relationships" xmlns:p="http://schemas.openxmlformats.org/presentationml/2006/main">
+  <p:cSld>
+    <p:spTree>
+      <p:nvGrpSpPr>
+        <p:cNvPr id="1" name=""/>
+        <p:cNvGrpSpPr/>
+        <p:nvPr/>
+      </p:nvGrpSpPr>
+      <p:grpSpPr>
+        <a:xfrm>
+          <a:off x="0" y="0"/>
+          <a:ext cx="0" cy="0"/>
+          <a:chOff x="0" y="0"/>
+          <a:chExt cx="0" cy="0"/>
+        </a:xfrm>
+      </p:grpSpPr>
+      <p:sp>
+        <p:nvSpPr>
+          <p:cNvPr id="3" name="Title 2">
+            <a:extLst>
+              <a:ext uri="{FF2B5EF4-FFF2-40B4-BE49-F238E27FC236}">
+                <a16:creationId xmlns:a16="http://schemas.microsoft.com/office/drawing/2014/main" id="{417DDE6D-77BE-4942-4637-2FECE1CB1364}"/>
+              </a:ext>
+            </a:extLst>
+          </p:cNvPr>
+          <p:cNvSpPr>
+            <a:spLocks noGrp="1"/>
+          </p:cNvSpPr>
+          <p:nvPr>
+            <p:ph type="title"/>
+          </p:nvPr>
+        </p:nvSpPr>
+        <p:spPr>
+          <a:xfrm>
+            <a:off x="1451579" y="540327"/>
+            <a:ext cx="9291215" cy="983673"/>
+          </a:xfrm>
+        </p:spPr>
+        <p:txBody>
+          <a:bodyPr/>
+          <a:lstStyle/>
+          <a:p>
+            <a:r>
+              <a:rPr lang="en-IN" u="sng" dirty="0"/>
+              <a:t>Conclusion</a:t>
+            </a:r>
+            <a:r>
+              <a:rPr lang="en-IN" dirty="0"/>
+              <a:t>:</a:t>
+            </a:r>
+          </a:p>
+        </p:txBody>
+      </p:sp>
+      <p:sp>
+        <p:nvSpPr>
+          <p:cNvPr id="4" name="Content Placeholder 3">
+            <a:extLst>
+              <a:ext uri="{FF2B5EF4-FFF2-40B4-BE49-F238E27FC236}">
+                <a16:creationId xmlns:a16="http://schemas.microsoft.com/office/drawing/2014/main" id="{9AC36FDC-B3BD-128E-167D-515D438144C6}"/>
+              </a:ext>
+            </a:extLst>
+          </p:cNvPr>
+          <p:cNvSpPr>
+            <a:spLocks noGrp="1"/>
+          </p:cNvSpPr>
+          <p:nvPr>
+            <p:ph idx="1"/>
+          </p:nvPr>
+        </p:nvSpPr>
+        <p:spPr>
+          <a:xfrm>
+            <a:off x="1451579" y="1634836"/>
+            <a:ext cx="9291215" cy="3831509"/>
+          </a:xfrm>
+        </p:spPr>
+        <p:txBody>
+          <a:bodyPr/>
+          <a:lstStyle/>
+          <a:p>
+            <a:r>
+              <a:rPr lang="en-IN" dirty="0"/>
+              <a:t>From this project we have predicted people suffering from diabetes disease using multiple Machine Learning models and developed the best intelligent system for prediction based on their accuracy score.</a:t>
+            </a:r>
+          </a:p>
+          <a:p>
+            <a:r>
+              <a:rPr lang="en-IN" dirty="0"/>
+              <a:t>Individually Logistic Regression giving us the best accuracy score about 75% but after using Stacking one of the Ensemble technique giving us accuracy score about 81% in predicting the diabetes disease correctly.</a:t>
+            </a:r>
+          </a:p>
+          <a:p>
+            <a:r>
+              <a:rPr lang="en-IN" dirty="0"/>
+              <a:t>So, we can conclude that Stacking is the best Machine Learning model in predicting the diabetes disease correctly with an accuracy score of 81%.</a:t>
+            </a:r>
+          </a:p>
+        </p:txBody>
+      </p:sp>
+    </p:spTree>
+    <p:extLst>
+      <p:ext uri="{BB962C8B-B14F-4D97-AF65-F5344CB8AC3E}">
+        <p14:creationId xmlns:p14="http://schemas.microsoft.com/office/powerpoint/2010/main" val="2532149091"/>
+      </p:ext>
+    </p:extLst>
+  </p:cSld>
+  <p:clrMapOvr>
+    <a:masterClrMapping/>
+  </p:clrMapOvr>
+</p:sld>
+</file>
+
+<file path=ppt/slides/slide21.xml><?xml version="1.0" encoding="utf-8"?>
+<p:sld xmlns:a="http://schemas.openxmlformats.org/drawingml/2006/main" xmlns:r="http://schemas.openxmlformats.org/officeDocument/2006/relationships" xmlns:p="http://schemas.openxmlformats.org/presentationml/2006/main">
+  <p:cSld>
+    <p:spTree>
+      <p:nvGrpSpPr>
+        <p:cNvPr id="1" name=""/>
+        <p:cNvGrpSpPr/>
+        <p:nvPr/>
+      </p:nvGrpSpPr>
+      <p:grpSpPr>
+        <a:xfrm>
+          <a:off x="0" y="0"/>
+          <a:ext cx="0" cy="0"/>
+          <a:chOff x="0" y="0"/>
+          <a:chExt cx="0" cy="0"/>
+        </a:xfrm>
+      </p:grpSpPr>
+      <p:sp>
+        <p:nvSpPr>
+          <p:cNvPr id="2" name="Title 1">
+            <a:extLst>
+              <a:ext uri="{FF2B5EF4-FFF2-40B4-BE49-F238E27FC236}">
+                <a16:creationId xmlns:a16="http://schemas.microsoft.com/office/drawing/2014/main" id="{89E4BE97-78DD-D75A-AAAC-FCCFF7E18141}"/>
+              </a:ext>
+            </a:extLst>
+          </p:cNvPr>
+          <p:cNvSpPr>
+            <a:spLocks noGrp="1"/>
+          </p:cNvSpPr>
+          <p:nvPr>
+            <p:ph type="title"/>
+          </p:nvPr>
+        </p:nvSpPr>
+        <p:spPr>
+          <a:xfrm>
+            <a:off x="1451579" y="804519"/>
+            <a:ext cx="9291215" cy="3545808"/>
+          </a:xfrm>
+        </p:spPr>
+        <p:txBody>
+          <a:bodyPr>
+            <a:normAutofit/>
+          </a:bodyPr>
+          <a:lstStyle/>
+          <a:p>
+            <a:r>
+              <a:rPr lang="en-IN" dirty="0"/>
+              <a:t>Thank you</a:t>
+            </a:r>
+            <a:br>
+              <a:rPr lang="en-IN" dirty="0"/>
+            </a:br>
+            <a:br>
+              <a:rPr lang="en-IN" dirty="0"/>
+            </a:br>
+            <a:br>
+              <a:rPr lang="en-IN" dirty="0"/>
+            </a:br>
+            <a:br>
+              <a:rPr lang="en-IN" dirty="0"/>
+            </a:br>
+            <a:r>
+              <a:rPr lang="en-IN" sz="2400" dirty="0"/>
+              <a:t>Any queries are welcomed</a:t>
+            </a:r>
+            <a:br>
+              <a:rPr lang="en-IN" dirty="0"/>
+            </a:br>
+            <a:br>
+              <a:rPr lang="en-IN" dirty="0"/>
+            </a:br>
+            <a:endParaRPr lang="en-IN" dirty="0"/>
+          </a:p>
+        </p:txBody>
+      </p:sp>
+    </p:spTree>
+    <p:extLst>
+      <p:ext uri="{BB962C8B-B14F-4D97-AF65-F5344CB8AC3E}">
+        <p14:creationId xmlns:p14="http://schemas.microsoft.com/office/powerpoint/2010/main" val="3738089362"/>
       </p:ext>
     </p:extLst>
   </p:cSld>
@@ -4975,8 +5568,12 @@
           <a:lstStyle/>
           <a:p>
             <a:r>
+              <a:rPr lang="en-IN" u="sng" dirty="0"/>
+              <a:t>Aim of the project</a:t>
+            </a:r>
+            <a:r>
               <a:rPr lang="en-IN" dirty="0"/>
-              <a:t>Aim of the project:</a:t>
+              <a:t>:</a:t>
             </a:r>
           </a:p>
         </p:txBody>
@@ -5063,8 +5660,12 @@
           <a:lstStyle/>
           <a:p>
             <a:r>
+              <a:rPr lang="en-IN" u="sng" dirty="0"/>
+              <a:t>Introduction</a:t>
+            </a:r>
+            <a:r>
               <a:rPr lang="en-IN" dirty="0"/>
-              <a:t>Introduction:</a:t>
+              <a:t>:</a:t>
             </a:r>
           </a:p>
         </p:txBody>
@@ -5168,14 +5769,23 @@
             <p:ph type="title"/>
           </p:nvPr>
         </p:nvSpPr>
-        <p:spPr/>
+        <p:spPr>
+          <a:xfrm>
+            <a:off x="1449217" y="277091"/>
+            <a:ext cx="9293577" cy="890665"/>
+          </a:xfrm>
+        </p:spPr>
         <p:txBody>
           <a:bodyPr/>
           <a:lstStyle/>
           <a:p>
             <a:r>
+              <a:rPr lang="en-IN" u="sng" dirty="0"/>
+              <a:t>Motivation</a:t>
+            </a:r>
+            <a:r>
               <a:rPr lang="en-IN" dirty="0"/>
-              <a:t>Motivation:</a:t>
+              <a:t>:</a:t>
             </a:r>
           </a:p>
         </p:txBody>
@@ -5198,13 +5808,13 @@
         </p:nvSpPr>
         <p:spPr>
           <a:xfrm>
-            <a:off x="706582" y="2010878"/>
-            <a:ext cx="5229403" cy="3835740"/>
+            <a:off x="110836" y="1316182"/>
+            <a:ext cx="5458691" cy="4530436"/>
           </a:xfrm>
         </p:spPr>
         <p:txBody>
           <a:bodyPr>
-            <a:normAutofit fontScale="85000" lnSpcReduction="20000"/>
+            <a:normAutofit lnSpcReduction="10000"/>
           </a:bodyPr>
           <a:lstStyle/>
           <a:p>
@@ -5255,10 +5865,10 @@
       </p:sp>
       <p:pic>
         <p:nvPicPr>
-          <p:cNvPr id="15" name="Picture Placeholder 7">
+          <p:cNvPr id="7" name="Content Placeholder 6">
             <a:extLst>
               <a:ext uri="{FF2B5EF4-FFF2-40B4-BE49-F238E27FC236}">
-                <a16:creationId xmlns:a16="http://schemas.microsoft.com/office/drawing/2014/main" id="{2A54A08D-A748-EE8F-764C-909EA03E48EE}"/>
+                <a16:creationId xmlns:a16="http://schemas.microsoft.com/office/drawing/2014/main" id="{BCFF631E-D0E1-DD5D-9625-8533343EC448}"/>
               </a:ext>
             </a:extLst>
           </p:cNvPr>
@@ -5269,75 +5879,24 @@
             <p:ph sz="half" idx="2"/>
           </p:nvPr>
         </p:nvPicPr>
-        <p:blipFill>
+        <p:blipFill rotWithShape="1">
           <a:blip r:embed="rId2">
             <a:extLst>
               <a:ext uri="{28A0092B-C50C-407E-A947-70E740481C1C}">
                 <a14:useLocalDpi xmlns:a14="http://schemas.microsoft.com/office/drawing/2010/main" val="0"/>
               </a:ext>
-              <a:ext uri="{837473B0-CC2E-450A-ABE3-18F120FF3D39}">
-                <a1611:picAttrSrcUrl xmlns:a1611="http://schemas.microsoft.com/office/drawing/2016/11/main" r:id="rId3"/>
-              </a:ext>
             </a:extLst>
           </a:blip>
-          <a:srcRect t="6808" b="6808"/>
+          <a:srcRect l="19234" t="41072" r="32403" b="23572"/>
           <a:stretch/>
         </p:blipFill>
         <p:spPr>
           <a:xfrm>
-            <a:off x="6256017" y="2055491"/>
-            <a:ext cx="5797438" cy="3634753"/>
+            <a:off x="5832765" y="1316182"/>
+            <a:ext cx="6137562" cy="4433454"/>
           </a:xfrm>
         </p:spPr>
       </p:pic>
-      <p:sp>
-        <p:nvSpPr>
-          <p:cNvPr id="16" name="TextBox 15">
-            <a:extLst>
-              <a:ext uri="{FF2B5EF4-FFF2-40B4-BE49-F238E27FC236}">
-                <a16:creationId xmlns:a16="http://schemas.microsoft.com/office/drawing/2014/main" id="{FCA61403-2DC4-3347-3C98-654680F336A8}"/>
-              </a:ext>
-            </a:extLst>
-          </p:cNvPr>
-          <p:cNvSpPr txBox="1"/>
-          <p:nvPr/>
-        </p:nvSpPr>
-        <p:spPr>
-          <a:xfrm>
-            <a:off x="6256017" y="5459412"/>
-            <a:ext cx="5797438" cy="230832"/>
-          </a:xfrm>
-          <a:prstGeom prst="rect">
-            <a:avLst/>
-          </a:prstGeom>
-          <a:noFill/>
-        </p:spPr>
-        <p:txBody>
-          <a:bodyPr wrap="square" rtlCol="0">
-            <a:spAutoFit/>
-          </a:bodyPr>
-          <a:lstStyle/>
-          <a:p>
-            <a:r>
-              <a:rPr lang="en-IN" sz="900">
-                <a:hlinkClick r:id="rId3" tooltip="https://bmjopen.bmj.com/content/8/2/e018288"/>
-              </a:rPr>
-              <a:t>This Photo</a:t>
-            </a:r>
-            <a:r>
-              <a:rPr lang="en-IN" sz="900"/>
-              <a:t> by Unknown Author is licensed under </a:t>
-            </a:r>
-            <a:r>
-              <a:rPr lang="en-IN" sz="900">
-                <a:hlinkClick r:id="rId4" tooltip="https://creativecommons.org/licenses/by-nc/3.0/"/>
-              </a:rPr>
-              <a:t>CC BY-NC</a:t>
-            </a:r>
-            <a:endParaRPr lang="en-IN" sz="900"/>
-          </a:p>
-        </p:txBody>
-      </p:sp>
     </p:spTree>
     <p:extLst>
       <p:ext uri="{BB962C8B-B14F-4D97-AF65-F5344CB8AC3E}">
@@ -5384,14 +5943,23 @@
             <p:ph type="title"/>
           </p:nvPr>
         </p:nvSpPr>
-        <p:spPr/>
+        <p:spPr>
+          <a:xfrm>
+            <a:off x="1451579" y="360219"/>
+            <a:ext cx="9291215" cy="928254"/>
+          </a:xfrm>
+        </p:spPr>
         <p:txBody>
           <a:bodyPr/>
           <a:lstStyle/>
           <a:p>
             <a:r>
+              <a:rPr lang="en-IN" u="sng" dirty="0"/>
+              <a:t>Future scope of the project</a:t>
+            </a:r>
+            <a:r>
               <a:rPr lang="en-IN" dirty="0"/>
-              <a:t>Purpose of the project:</a:t>
+              <a:t>:</a:t>
             </a:r>
           </a:p>
         </p:txBody>
@@ -5412,10 +5980,15 @@
             <p:ph idx="1"/>
           </p:nvPr>
         </p:nvSpPr>
-        <p:spPr/>
+        <p:spPr>
+          <a:xfrm>
+            <a:off x="1451579" y="1399310"/>
+            <a:ext cx="9291215" cy="4067036"/>
+          </a:xfrm>
+        </p:spPr>
         <p:txBody>
           <a:bodyPr>
-            <a:normAutofit lnSpcReduction="10000"/>
+            <a:normAutofit/>
           </a:bodyPr>
           <a:lstStyle/>
           <a:p>
@@ -5498,8 +6071,8 @@
         </p:nvSpPr>
         <p:spPr>
           <a:xfrm>
-            <a:off x="1451579" y="346364"/>
-            <a:ext cx="9291215" cy="956703"/>
+            <a:off x="1451579" y="138546"/>
+            <a:ext cx="9291215" cy="870858"/>
           </a:xfrm>
         </p:spPr>
         <p:txBody>
@@ -5507,105 +6080,22 @@
           <a:lstStyle/>
           <a:p>
             <a:r>
+              <a:rPr lang="en-IN" u="sng" dirty="0"/>
+              <a:t>Objectives</a:t>
+            </a:r>
+            <a:r>
               <a:rPr lang="en-IN" dirty="0"/>
-              <a:t>Objectives:</a:t>
+              <a:t>:</a:t>
             </a:r>
           </a:p>
         </p:txBody>
       </p:sp>
       <p:pic>
         <p:nvPicPr>
-          <p:cNvPr id="7" name="Picture 6">
+          <p:cNvPr id="3" name="Picture 2">
             <a:extLst>
               <a:ext uri="{FF2B5EF4-FFF2-40B4-BE49-F238E27FC236}">
-                <a16:creationId xmlns:a16="http://schemas.microsoft.com/office/drawing/2014/main" id="{E6CC5016-46F5-8126-7C0F-5485F90B93B7}"/>
-              </a:ext>
-            </a:extLst>
-          </p:cNvPr>
-          <p:cNvPicPr>
-            <a:picLocks noChangeAspect="1"/>
-          </p:cNvPicPr>
-          <p:nvPr/>
-        </p:nvPicPr>
-        <p:blipFill>
-          <a:blip r:embed="rId2">
-            <a:extLst>
-              <a:ext uri="{28A0092B-C50C-407E-A947-70E740481C1C}">
-                <a14:useLocalDpi xmlns:a14="http://schemas.microsoft.com/office/drawing/2010/main" val="0"/>
-              </a:ext>
-              <a:ext uri="{837473B0-CC2E-450A-ABE3-18F120FF3D39}">
-                <a1611:picAttrSrcUrl xmlns:a1611="http://schemas.microsoft.com/office/drawing/2016/11/main" r:id="rId3"/>
-              </a:ext>
-            </a:extLst>
-          </a:blip>
-          <a:stretch>
-            <a:fillRect/>
-          </a:stretch>
-        </p:blipFill>
-        <p:spPr>
-          <a:xfrm>
-            <a:off x="318656" y="1303067"/>
-            <a:ext cx="5403272" cy="4482698"/>
-          </a:xfrm>
-          <a:prstGeom prst="rect">
-            <a:avLst/>
-          </a:prstGeom>
-        </p:spPr>
-      </p:pic>
-      <p:sp>
-        <p:nvSpPr>
-          <p:cNvPr id="8" name="TextBox 7">
-            <a:extLst>
-              <a:ext uri="{FF2B5EF4-FFF2-40B4-BE49-F238E27FC236}">
-                <a16:creationId xmlns:a16="http://schemas.microsoft.com/office/drawing/2014/main" id="{9A7C1AF1-D12F-AA27-094A-F5FBCAD1848F}"/>
-              </a:ext>
-            </a:extLst>
-          </p:cNvPr>
-          <p:cNvSpPr txBox="1"/>
-          <p:nvPr/>
-        </p:nvSpPr>
-        <p:spPr>
-          <a:xfrm>
-            <a:off x="1052945" y="5019897"/>
-            <a:ext cx="9919855" cy="230832"/>
-          </a:xfrm>
-          <a:prstGeom prst="rect">
-            <a:avLst/>
-          </a:prstGeom>
-          <a:noFill/>
-        </p:spPr>
-        <p:txBody>
-          <a:bodyPr wrap="square" rtlCol="0">
-            <a:spAutoFit/>
-          </a:bodyPr>
-          <a:lstStyle/>
-          <a:p>
-            <a:r>
-              <a:rPr lang="en-IN" sz="900">
-                <a:hlinkClick r:id="rId3" tooltip="https://www.actuaries.digital/2016/07/28/dat203x-data-science-and-machine-learning/"/>
-              </a:rPr>
-              <a:t>This Photo</a:t>
-            </a:r>
-            <a:r>
-              <a:rPr lang="en-IN" sz="900"/>
-              <a:t> by Unknown Author is licensed under </a:t>
-            </a:r>
-            <a:r>
-              <a:rPr lang="en-IN" sz="900">
-                <a:hlinkClick r:id="rId4" tooltip="https://creativecommons.org/licenses/by-nc-nd/3.0/"/>
-              </a:rPr>
-              <a:t>CC BY-NC-ND</a:t>
-            </a:r>
-            <a:endParaRPr lang="en-IN" sz="900"/>
-          </a:p>
-        </p:txBody>
-      </p:sp>
-      <p:pic>
-        <p:nvPicPr>
-          <p:cNvPr id="10" name="Picture 9">
-            <a:extLst>
-              <a:ext uri="{FF2B5EF4-FFF2-40B4-BE49-F238E27FC236}">
-                <a16:creationId xmlns:a16="http://schemas.microsoft.com/office/drawing/2014/main" id="{E6D9ADB8-C789-DA89-339C-076832E4F79A}"/>
+                <a16:creationId xmlns:a16="http://schemas.microsoft.com/office/drawing/2014/main" id="{6BA6129D-3201-993D-5A75-84F867F8950D}"/>
               </a:ext>
             </a:extLst>
           </p:cNvPr>
@@ -5615,20 +6105,20 @@
           <p:nvPr/>
         </p:nvPicPr>
         <p:blipFill rotWithShape="1">
-          <a:blip r:embed="rId5">
+          <a:blip r:embed="rId2">
             <a:extLst>
               <a:ext uri="{28A0092B-C50C-407E-A947-70E740481C1C}">
                 <a14:useLocalDpi xmlns:a14="http://schemas.microsoft.com/office/drawing/2010/main" val="0"/>
               </a:ext>
             </a:extLst>
           </a:blip>
-          <a:srcRect l="6017" t="10761" r="24694" b="26139"/>
+          <a:srcRect l="9099" t="33574" r="30039" b="9535"/>
           <a:stretch/>
         </p:blipFill>
         <p:spPr>
           <a:xfrm>
-            <a:off x="6096000" y="1303067"/>
-            <a:ext cx="5777343" cy="4482698"/>
+            <a:off x="581891" y="1009405"/>
+            <a:ext cx="11028218" cy="4839192"/>
           </a:xfrm>
           <a:prstGeom prst="rect">
             <a:avLst/>
@@ -5792,7 +6282,7 @@
           <p:cNvPr id="2" name="Title 1">
             <a:extLst>
               <a:ext uri="{FF2B5EF4-FFF2-40B4-BE49-F238E27FC236}">
-                <a16:creationId xmlns:a16="http://schemas.microsoft.com/office/drawing/2014/main" id="{C035833B-4996-3B97-5EE6-51C33DB56FB3}"/>
+                <a16:creationId xmlns:a16="http://schemas.microsoft.com/office/drawing/2014/main" id="{898357DE-3ED0-50BA-B43F-8F31A15DFFED}"/>
               </a:ext>
             </a:extLst>
           </p:cNvPr>
@@ -5805,83 +6295,40 @@
         </p:nvSpPr>
         <p:spPr>
           <a:xfrm>
-            <a:off x="1451579" y="166256"/>
-            <a:ext cx="9291215" cy="734290"/>
-          </a:xfrm>
-        </p:spPr>
-        <p:txBody>
-          <a:bodyPr>
-            <a:normAutofit/>
-          </a:bodyPr>
-          <a:lstStyle/>
-          <a:p>
+            <a:off x="1451579" y="221674"/>
+            <a:ext cx="9291215" cy="817418"/>
+          </a:xfrm>
+        </p:spPr>
+        <p:txBody>
+          <a:bodyPr/>
+          <a:lstStyle/>
+          <a:p>
+            <a:r>
+              <a:rPr lang="en-IN" u="sng" dirty="0"/>
+              <a:t>Dataset of the project</a:t>
+            </a:r>
             <a:r>
               <a:rPr lang="en-IN" dirty="0"/>
-              <a:t>Exploratory data analysis:</a:t>
-            </a:r>
-          </a:p>
-        </p:txBody>
-      </p:sp>
-      <p:sp>
-        <p:nvSpPr>
-          <p:cNvPr id="3" name="Content Placeholder 2">
+              <a:t>:</a:t>
+            </a:r>
+          </a:p>
+        </p:txBody>
+      </p:sp>
+      <p:pic>
+        <p:nvPicPr>
+          <p:cNvPr id="5" name="Content Placeholder 4">
             <a:extLst>
               <a:ext uri="{FF2B5EF4-FFF2-40B4-BE49-F238E27FC236}">
-                <a16:creationId xmlns:a16="http://schemas.microsoft.com/office/drawing/2014/main" id="{933EB580-4E52-C11D-7FD7-DC2C09E2EFB7}"/>
-              </a:ext>
-            </a:extLst>
-          </p:cNvPr>
-          <p:cNvSpPr>
-            <a:spLocks noGrp="1"/>
-          </p:cNvSpPr>
-          <p:nvPr>
-            <p:ph idx="1"/>
-          </p:nvPr>
-        </p:nvSpPr>
-        <p:spPr>
-          <a:xfrm>
-            <a:off x="177737" y="1025236"/>
-            <a:ext cx="5253245" cy="4441109"/>
-          </a:xfrm>
-        </p:spPr>
-        <p:txBody>
-          <a:bodyPr>
-            <a:normAutofit/>
-          </a:bodyPr>
-          <a:lstStyle/>
-          <a:p>
-            <a:r>
-              <a:rPr lang="en-IN" dirty="0"/>
-              <a:t>With Exploratory data analysis we can able to understand our data in better way.</a:t>
-            </a:r>
-          </a:p>
-          <a:p>
-            <a:r>
-              <a:rPr lang="en-IN" dirty="0"/>
-              <a:t>Here we can find out data distribution, relationship between the variables.</a:t>
-            </a:r>
-          </a:p>
-          <a:p>
-            <a:r>
-              <a:rPr lang="en-IN" dirty="0"/>
-              <a:t>Also we have performed various visualization plots in finding the relationship between them like histogram ,point plot, scatter plot, box plot, regression plot etc.</a:t>
-            </a:r>
-          </a:p>
-        </p:txBody>
-      </p:sp>
-      <p:pic>
-        <p:nvPicPr>
-          <p:cNvPr id="5" name="Picture 4">
-            <a:extLst>
-              <a:ext uri="{FF2B5EF4-FFF2-40B4-BE49-F238E27FC236}">
-                <a16:creationId xmlns:a16="http://schemas.microsoft.com/office/drawing/2014/main" id="{0265A780-0434-1618-9379-1B52386B7BFC}"/>
+                <a16:creationId xmlns:a16="http://schemas.microsoft.com/office/drawing/2014/main" id="{D588E12F-2F1F-1EDD-DDD1-2CAC04C12712}"/>
               </a:ext>
             </a:extLst>
           </p:cNvPr>
           <p:cNvPicPr>
-            <a:picLocks noChangeAspect="1"/>
+            <a:picLocks noGrp="1" noChangeAspect="1"/>
           </p:cNvPicPr>
-          <p:nvPr/>
+          <p:nvPr>
+            <p:ph idx="1"/>
+          </p:nvPr>
         </p:nvPicPr>
         <p:blipFill rotWithShape="1">
           <a:blip r:embed="rId2">
@@ -5891,23 +6338,20 @@
               </a:ext>
             </a:extLst>
           </a:blip>
-          <a:srcRect l="6350" t="8468" r="32511" b="12934"/>
+          <a:srcRect l="7386" t="10525" r="30455" b="26024"/>
           <a:stretch/>
         </p:blipFill>
         <p:spPr>
           <a:xfrm>
-            <a:off x="5084618" y="1025236"/>
-            <a:ext cx="6929646" cy="4696691"/>
-          </a:xfrm>
-          <a:prstGeom prst="rect">
-            <a:avLst/>
-          </a:prstGeom>
+            <a:off x="0" y="1039092"/>
+            <a:ext cx="12191999" cy="4571999"/>
+          </a:xfrm>
         </p:spPr>
       </p:pic>
     </p:spTree>
     <p:extLst>
       <p:ext uri="{BB962C8B-B14F-4D97-AF65-F5344CB8AC3E}">
-        <p14:creationId xmlns:p14="http://schemas.microsoft.com/office/powerpoint/2010/main" val="1565147232"/>
+        <p14:creationId xmlns:p14="http://schemas.microsoft.com/office/powerpoint/2010/main" val="1578610247"/>
       </p:ext>
     </p:extLst>
   </p:cSld>

</xml_diff>